<commit_message>
finished initial version, add slide to explain HEAD and how to pick a base to reroll int. rebase
</commit_message>
<xml_diff>
--- a/cdc_git_ws2.pptx
+++ b/cdc_git_ws2.pptx
@@ -5,7 +5,7 @@
     <p:sldMasterId id="2147483648" r:id="rId4"/>
   </p:sldMasterIdLst>
   <p:notesMasterIdLst>
-    <p:notesMasterId r:id="rId12"/>
+    <p:notesMasterId r:id="rId14"/>
   </p:notesMasterIdLst>
   <p:sldIdLst>
     <p:sldId id="256" r:id="rId5"/>
@@ -14,7 +14,9 @@
     <p:sldId id="310" r:id="rId8"/>
     <p:sldId id="296" r:id="rId9"/>
     <p:sldId id="305" r:id="rId10"/>
-    <p:sldId id="309" r:id="rId11"/>
+    <p:sldId id="311" r:id="rId11"/>
+    <p:sldId id="312" r:id="rId12"/>
+    <p:sldId id="309" r:id="rId13"/>
   </p:sldIdLst>
   <p:sldSz cx="6858000" cy="5143500"/>
   <p:notesSz cx="6858000" cy="9144000"/>
@@ -233,7 +235,7 @@
           <a:p>
             <a:fld id="{88EB923B-AC8F-4B84-A8E4-8B1F68B80157}" type="datetimeFigureOut">
               <a:rPr lang="en-US" smtClean="0"/>
-              <a:t>10/26/2016</a:t>
+              <a:t>11/3/2016</a:t>
             </a:fld>
             <a:endParaRPr lang="en-US"/>
           </a:p>
@@ -545,19 +547,7 @@
           <a:bodyPr/>
           <a:lstStyle/>
           <a:p>
-            <a:r>
-              <a:rPr lang="en-ID" dirty="0" smtClean="0"/>
-              <a:t>Example for interactive</a:t>
-            </a:r>
-            <a:r>
-              <a:rPr lang="en-ID" baseline="0" dirty="0" smtClean="0"/>
-              <a:t> rebase: </a:t>
-            </a:r>
-            <a:r>
-              <a:rPr lang="en-ID" b="1" baseline="0" dirty="0" smtClean="0"/>
-              <a:t>squashing commits</a:t>
-            </a:r>
-            <a:endParaRPr lang="en-US" b="1" dirty="0"/>
+            <a:endParaRPr lang="en-US" dirty="0"/>
           </a:p>
         </p:txBody>
       </p:sp>
@@ -578,7 +568,7 @@
           <a:p>
             <a:fld id="{7959948B-77FA-4B75-B65F-C5051F11C89F}" type="slidenum">
               <a:rPr lang="en-US" smtClean="0"/>
-              <a:t>3</a:t>
+              <a:t>1</a:t>
             </a:fld>
             <a:endParaRPr lang="en-US"/>
           </a:p>
@@ -587,7 +577,7 @@
     </p:spTree>
     <p:extLst>
       <p:ext uri="{BB962C8B-B14F-4D97-AF65-F5344CB8AC3E}">
-        <p14:creationId xmlns:p14="http://schemas.microsoft.com/office/powerpoint/2010/main" val="1323297392"/>
+        <p14:creationId xmlns:p14="http://schemas.microsoft.com/office/powerpoint/2010/main" val="865990022"/>
       </p:ext>
     </p:extLst>
   </p:cSld>
@@ -641,7 +631,15 @@
           <a:bodyPr/>
           <a:lstStyle/>
           <a:p>
-            <a:endParaRPr lang="en-US" b="1" dirty="0"/>
+            <a:r>
+              <a:rPr lang="en-ID" dirty="0" smtClean="0"/>
+              <a:t>- Trainees</a:t>
+            </a:r>
+            <a:r>
+              <a:rPr lang="en-ID" baseline="0" dirty="0" smtClean="0"/>
+              <a:t> should have a dedicated branch (hopefully they have the same trainers)</a:t>
+            </a:r>
+            <a:endParaRPr lang="en-US" dirty="0"/>
           </a:p>
         </p:txBody>
       </p:sp>
@@ -662,7 +660,7 @@
           <a:p>
             <a:fld id="{7959948B-77FA-4B75-B65F-C5051F11C89F}" type="slidenum">
               <a:rPr lang="en-US" smtClean="0"/>
-              <a:t>4</a:t>
+              <a:t>2</a:t>
             </a:fld>
             <a:endParaRPr lang="en-US"/>
           </a:p>
@@ -671,7 +669,7 @@
     </p:spTree>
     <p:extLst>
       <p:ext uri="{BB962C8B-B14F-4D97-AF65-F5344CB8AC3E}">
-        <p14:creationId xmlns:p14="http://schemas.microsoft.com/office/powerpoint/2010/main" val="173630211"/>
+        <p14:creationId xmlns:p14="http://schemas.microsoft.com/office/powerpoint/2010/main" val="2812428627"/>
       </p:ext>
     </p:extLst>
   </p:cSld>
@@ -725,7 +723,69 @@
           <a:bodyPr/>
           <a:lstStyle/>
           <a:p>
-            <a:endParaRPr lang="en-US" dirty="0"/>
+            <a:r>
+              <a:rPr lang="en-ID" dirty="0" smtClean="0"/>
+              <a:t>Example for interactive</a:t>
+            </a:r>
+            <a:r>
+              <a:rPr lang="en-ID" baseline="0" dirty="0" smtClean="0"/>
+              <a:t> rebase: </a:t>
+            </a:r>
+            <a:r>
+              <a:rPr lang="en-ID" b="1" baseline="0" dirty="0" smtClean="0"/>
+              <a:t>squashing commits </a:t>
+            </a:r>
+          </a:p>
+          <a:p>
+            <a:endParaRPr lang="en-ID" b="1" baseline="0" dirty="0" smtClean="0"/>
+          </a:p>
+          <a:p>
+            <a:r>
+              <a:rPr lang="en-ID" dirty="0" smtClean="0"/>
+              <a:t>pick 32618c4 Start developing a feature </a:t>
+            </a:r>
+          </a:p>
+          <a:p>
+            <a:r>
+              <a:rPr lang="en-ID" dirty="0" smtClean="0"/>
+              <a:t>pick 62eed47 Fix something from the previous commit </a:t>
+            </a:r>
+            <a:r>
+              <a:rPr lang="en-ID" dirty="0" smtClean="0">
+                <a:sym typeface="Wingdings" panose="05000000000000000000" pitchFamily="2" charset="2"/>
+              </a:rPr>
+              <a:t></a:t>
+            </a:r>
+          </a:p>
+          <a:p>
+            <a:endParaRPr lang="en-ID" b="1" dirty="0" smtClean="0">
+              <a:sym typeface="Wingdings" panose="05000000000000000000" pitchFamily="2" charset="2"/>
+            </a:endParaRPr>
+          </a:p>
+          <a:p>
+            <a:r>
+              <a:rPr lang="en-ID" dirty="0" smtClean="0"/>
+              <a:t>pick 32618c4 Start developing a feature </a:t>
+            </a:r>
+          </a:p>
+          <a:p>
+            <a:r>
+              <a:rPr lang="en-ID" dirty="0" smtClean="0"/>
+              <a:t>squash 62eed47 Fix something from the previous commit </a:t>
+            </a:r>
+            <a:r>
+              <a:rPr lang="en-ID" dirty="0" smtClean="0">
+                <a:sym typeface="Wingdings" panose="05000000000000000000" pitchFamily="2" charset="2"/>
+              </a:rPr>
+              <a:t> will end up in one commit, with new commit</a:t>
+            </a:r>
+            <a:r>
+              <a:rPr lang="en-ID" baseline="0" dirty="0" smtClean="0">
+                <a:sym typeface="Wingdings" panose="05000000000000000000" pitchFamily="2" charset="2"/>
+              </a:rPr>
+              <a:t> message</a:t>
+            </a:r>
+            <a:endParaRPr lang="en-US" b="1" dirty="0"/>
           </a:p>
         </p:txBody>
       </p:sp>
@@ -746,7 +806,7 @@
           <a:p>
             <a:fld id="{7959948B-77FA-4B75-B65F-C5051F11C89F}" type="slidenum">
               <a:rPr lang="en-US" smtClean="0"/>
-              <a:t>5</a:t>
+              <a:t>3</a:t>
             </a:fld>
             <a:endParaRPr lang="en-US"/>
           </a:p>
@@ -755,7 +815,7 @@
     </p:spTree>
     <p:extLst>
       <p:ext uri="{BB962C8B-B14F-4D97-AF65-F5344CB8AC3E}">
-        <p14:creationId xmlns:p14="http://schemas.microsoft.com/office/powerpoint/2010/main" val="3686657252"/>
+        <p14:creationId xmlns:p14="http://schemas.microsoft.com/office/powerpoint/2010/main" val="1323297392"/>
       </p:ext>
     </p:extLst>
   </p:cSld>
@@ -809,7 +869,11 @@
           <a:bodyPr/>
           <a:lstStyle/>
           <a:p>
-            <a:endParaRPr lang="en-US" dirty="0"/>
+            <a:r>
+              <a:rPr lang="en-ID" dirty="0" smtClean="0"/>
+              <a:t>Instead of blindly moving all of the commits to the new base, interactive rebasing gives you the opportunity to alter individual commits in the process. This lets you clean up history by removing, splitting, and altering an existing series of commits. It’s like git commit --amend on steroids.</a:t>
+            </a:r>
+            <a:endParaRPr lang="en-US" b="1" dirty="0"/>
           </a:p>
         </p:txBody>
       </p:sp>
@@ -830,7 +894,7 @@
           <a:p>
             <a:fld id="{7959948B-77FA-4B75-B65F-C5051F11C89F}" type="slidenum">
               <a:rPr lang="en-US" smtClean="0"/>
-              <a:t>6</a:t>
+              <a:t>4</a:t>
             </a:fld>
             <a:endParaRPr lang="en-US"/>
           </a:p>
@@ -839,7 +903,7 @@
     </p:spTree>
     <p:extLst>
       <p:ext uri="{BB962C8B-B14F-4D97-AF65-F5344CB8AC3E}">
-        <p14:creationId xmlns:p14="http://schemas.microsoft.com/office/powerpoint/2010/main" val="3385480470"/>
+        <p14:creationId xmlns:p14="http://schemas.microsoft.com/office/powerpoint/2010/main" val="173630211"/>
       </p:ext>
     </p:extLst>
   </p:cSld>
@@ -914,7 +978,436 @@
           <a:p>
             <a:fld id="{7959948B-77FA-4B75-B65F-C5051F11C89F}" type="slidenum">
               <a:rPr lang="en-US" smtClean="0"/>
+              <a:t>5</a:t>
+            </a:fld>
+            <a:endParaRPr lang="en-US"/>
+          </a:p>
+        </p:txBody>
+      </p:sp>
+    </p:spTree>
+    <p:extLst>
+      <p:ext uri="{BB962C8B-B14F-4D97-AF65-F5344CB8AC3E}">
+        <p14:creationId xmlns:p14="http://schemas.microsoft.com/office/powerpoint/2010/main" val="3686657252"/>
+      </p:ext>
+    </p:extLst>
+  </p:cSld>
+  <p:clrMapOvr>
+    <a:masterClrMapping/>
+  </p:clrMapOvr>
+</p:notes>
+</file>
+
+<file path=ppt/notesSlides/notesSlide6.xml><?xml version="1.0" encoding="utf-8"?>
+<p:notes xmlns:a="http://schemas.openxmlformats.org/drawingml/2006/main" xmlns:r="http://schemas.openxmlformats.org/officeDocument/2006/relationships" xmlns:p="http://schemas.openxmlformats.org/presentationml/2006/main">
+  <p:cSld>
+    <p:spTree>
+      <p:nvGrpSpPr>
+        <p:cNvPr id="1" name=""/>
+        <p:cNvGrpSpPr/>
+        <p:nvPr/>
+      </p:nvGrpSpPr>
+      <p:grpSpPr>
+        <a:xfrm>
+          <a:off x="0" y="0"/>
+          <a:ext cx="0" cy="0"/>
+          <a:chOff x="0" y="0"/>
+          <a:chExt cx="0" cy="0"/>
+        </a:xfrm>
+      </p:grpSpPr>
+      <p:sp>
+        <p:nvSpPr>
+          <p:cNvPr id="2" name="Slide Image Placeholder 1"/>
+          <p:cNvSpPr>
+            <a:spLocks noGrp="1" noRot="1" noChangeAspect="1"/>
+          </p:cNvSpPr>
+          <p:nvPr>
+            <p:ph type="sldImg"/>
+          </p:nvPr>
+        </p:nvSpPr>
+        <p:spPr/>
+      </p:sp>
+      <p:sp>
+        <p:nvSpPr>
+          <p:cNvPr id="3" name="Notes Placeholder 2"/>
+          <p:cNvSpPr>
+            <a:spLocks noGrp="1"/>
+          </p:cNvSpPr>
+          <p:nvPr>
+            <p:ph type="body" idx="1"/>
+          </p:nvPr>
+        </p:nvSpPr>
+        <p:spPr/>
+        <p:txBody>
+          <a:bodyPr/>
+          <a:lstStyle/>
+          <a:p>
+            <a:pPr marL="171450" indent="-171450">
+              <a:buFont typeface="Arial" panose="020B0604020202020204" pitchFamily="34" charset="0"/>
+              <a:buChar char="•"/>
+            </a:pPr>
+            <a:r>
+              <a:rPr lang="en-ID" dirty="0" smtClean="0"/>
+              <a:t>Be aware of rewriting</a:t>
+            </a:r>
+            <a:r>
+              <a:rPr lang="en-ID" baseline="0" dirty="0" smtClean="0"/>
+              <a:t> history in public commits (squashing, splitting, reorder)</a:t>
+            </a:r>
+            <a:endParaRPr lang="en-ID" dirty="0" smtClean="0"/>
+          </a:p>
+          <a:p>
+            <a:pPr marL="171450" indent="-171450">
+              <a:buFont typeface="Arial" panose="020B0604020202020204" pitchFamily="34" charset="0"/>
+              <a:buChar char="•"/>
+            </a:pPr>
+            <a:r>
+              <a:rPr lang="en-ID" dirty="0" smtClean="0"/>
+              <a:t>Difference to git commit</a:t>
+            </a:r>
+            <a:r>
+              <a:rPr lang="en-ID" baseline="0" dirty="0" smtClean="0"/>
+              <a:t> --amend .. Changes to recent commit (not all)</a:t>
+            </a:r>
+          </a:p>
+          <a:p>
+            <a:pPr marL="0" indent="0">
+              <a:buFontTx/>
+              <a:buNone/>
+            </a:pPr>
+            <a:endParaRPr lang="en-ID" baseline="0" dirty="0" smtClean="0"/>
+          </a:p>
+          <a:p>
+            <a:pPr marL="171450" indent="-171450">
+              <a:buFont typeface="Arial" panose="020B0604020202020204" pitchFamily="34" charset="0"/>
+              <a:buChar char="•"/>
+            </a:pPr>
+            <a:r>
+              <a:rPr lang="en-ID" baseline="0" dirty="0" smtClean="0"/>
+              <a:t>Running the command pops up a editor with rebase script (see bottom of slide, start from pick)</a:t>
+            </a:r>
+          </a:p>
+          <a:p>
+            <a:pPr marL="171450" indent="-171450">
+              <a:buFont typeface="Arial" panose="020B0604020202020204" pitchFamily="34" charset="0"/>
+              <a:buChar char="•"/>
+            </a:pPr>
+            <a:endParaRPr lang="en-ID" baseline="0" dirty="0" smtClean="0"/>
+          </a:p>
+          <a:p>
+            <a:pPr marL="171450" indent="-171450">
+              <a:buFontTx/>
+              <a:buChar char="-"/>
+            </a:pPr>
+            <a:endParaRPr lang="en-US" dirty="0"/>
+          </a:p>
+        </p:txBody>
+      </p:sp>
+      <p:sp>
+        <p:nvSpPr>
+          <p:cNvPr id="4" name="Slide Number Placeholder 3"/>
+          <p:cNvSpPr>
+            <a:spLocks noGrp="1"/>
+          </p:cNvSpPr>
+          <p:nvPr>
+            <p:ph type="sldNum" sz="quarter" idx="10"/>
+          </p:nvPr>
+        </p:nvSpPr>
+        <p:spPr/>
+        <p:txBody>
+          <a:bodyPr/>
+          <a:lstStyle/>
+          <a:p>
+            <a:fld id="{7959948B-77FA-4B75-B65F-C5051F11C89F}" type="slidenum">
+              <a:rPr lang="en-US" smtClean="0"/>
+              <a:t>6</a:t>
+            </a:fld>
+            <a:endParaRPr lang="en-US"/>
+          </a:p>
+        </p:txBody>
+      </p:sp>
+    </p:spTree>
+    <p:extLst>
+      <p:ext uri="{BB962C8B-B14F-4D97-AF65-F5344CB8AC3E}">
+        <p14:creationId xmlns:p14="http://schemas.microsoft.com/office/powerpoint/2010/main" val="3385480470"/>
+      </p:ext>
+    </p:extLst>
+  </p:cSld>
+  <p:clrMapOvr>
+    <a:masterClrMapping/>
+  </p:clrMapOvr>
+</p:notes>
+</file>
+
+<file path=ppt/notesSlides/notesSlide7.xml><?xml version="1.0" encoding="utf-8"?>
+<p:notes xmlns:a="http://schemas.openxmlformats.org/drawingml/2006/main" xmlns:r="http://schemas.openxmlformats.org/officeDocument/2006/relationships" xmlns:p="http://schemas.openxmlformats.org/presentationml/2006/main">
+  <p:cSld>
+    <p:spTree>
+      <p:nvGrpSpPr>
+        <p:cNvPr id="1" name=""/>
+        <p:cNvGrpSpPr/>
+        <p:nvPr/>
+      </p:nvGrpSpPr>
+      <p:grpSpPr>
+        <a:xfrm>
+          <a:off x="0" y="0"/>
+          <a:ext cx="0" cy="0"/>
+          <a:chOff x="0" y="0"/>
+          <a:chExt cx="0" cy="0"/>
+        </a:xfrm>
+      </p:grpSpPr>
+      <p:sp>
+        <p:nvSpPr>
+          <p:cNvPr id="2" name="Slide Image Placeholder 1"/>
+          <p:cNvSpPr>
+            <a:spLocks noGrp="1" noRot="1" noChangeAspect="1"/>
+          </p:cNvSpPr>
+          <p:nvPr>
+            <p:ph type="sldImg"/>
+          </p:nvPr>
+        </p:nvSpPr>
+        <p:spPr/>
+      </p:sp>
+      <p:sp>
+        <p:nvSpPr>
+          <p:cNvPr id="3" name="Notes Placeholder 2"/>
+          <p:cNvSpPr>
+            <a:spLocks noGrp="1"/>
+          </p:cNvSpPr>
+          <p:nvPr>
+            <p:ph type="body" idx="1"/>
+          </p:nvPr>
+        </p:nvSpPr>
+        <p:spPr/>
+        <p:txBody>
+          <a:bodyPr/>
+          <a:lstStyle/>
+          <a:p>
+            <a:r>
+              <a:rPr lang="en-ID" dirty="0" smtClean="0"/>
+              <a:t>We replay</a:t>
+            </a:r>
+            <a:r>
+              <a:rPr lang="en-ID" baseline="0" dirty="0" smtClean="0"/>
+              <a:t> the commands with the &lt;base&gt; we picked</a:t>
+            </a:r>
+            <a:endParaRPr lang="en-US" dirty="0"/>
+          </a:p>
+        </p:txBody>
+      </p:sp>
+      <p:sp>
+        <p:nvSpPr>
+          <p:cNvPr id="4" name="Slide Number Placeholder 3"/>
+          <p:cNvSpPr>
+            <a:spLocks noGrp="1"/>
+          </p:cNvSpPr>
+          <p:nvPr>
+            <p:ph type="sldNum" sz="quarter" idx="10"/>
+          </p:nvPr>
+        </p:nvSpPr>
+        <p:spPr/>
+        <p:txBody>
+          <a:bodyPr/>
+          <a:lstStyle/>
+          <a:p>
+            <a:fld id="{7959948B-77FA-4B75-B65F-C5051F11C89F}" type="slidenum">
+              <a:rPr lang="en-US" smtClean="0"/>
               <a:t>7</a:t>
+            </a:fld>
+            <a:endParaRPr lang="en-US"/>
+          </a:p>
+        </p:txBody>
+      </p:sp>
+    </p:spTree>
+    <p:extLst>
+      <p:ext uri="{BB962C8B-B14F-4D97-AF65-F5344CB8AC3E}">
+        <p14:creationId xmlns:p14="http://schemas.microsoft.com/office/powerpoint/2010/main" val="1378468890"/>
+      </p:ext>
+    </p:extLst>
+  </p:cSld>
+  <p:clrMapOvr>
+    <a:masterClrMapping/>
+  </p:clrMapOvr>
+</p:notes>
+</file>
+
+<file path=ppt/notesSlides/notesSlide8.xml><?xml version="1.0" encoding="utf-8"?>
+<p:notes xmlns:a="http://schemas.openxmlformats.org/drawingml/2006/main" xmlns:r="http://schemas.openxmlformats.org/officeDocument/2006/relationships" xmlns:p="http://schemas.openxmlformats.org/presentationml/2006/main">
+  <p:cSld>
+    <p:spTree>
+      <p:nvGrpSpPr>
+        <p:cNvPr id="1" name=""/>
+        <p:cNvGrpSpPr/>
+        <p:nvPr/>
+      </p:nvGrpSpPr>
+      <p:grpSpPr>
+        <a:xfrm>
+          <a:off x="0" y="0"/>
+          <a:ext cx="0" cy="0"/>
+          <a:chOff x="0" y="0"/>
+          <a:chExt cx="0" cy="0"/>
+        </a:xfrm>
+      </p:grpSpPr>
+      <p:sp>
+        <p:nvSpPr>
+          <p:cNvPr id="2" name="Slide Image Placeholder 1"/>
+          <p:cNvSpPr>
+            <a:spLocks noGrp="1" noRot="1" noChangeAspect="1"/>
+          </p:cNvSpPr>
+          <p:nvPr>
+            <p:ph type="sldImg"/>
+          </p:nvPr>
+        </p:nvSpPr>
+        <p:spPr/>
+      </p:sp>
+      <p:sp>
+        <p:nvSpPr>
+          <p:cNvPr id="3" name="Notes Placeholder 2"/>
+          <p:cNvSpPr>
+            <a:spLocks noGrp="1"/>
+          </p:cNvSpPr>
+          <p:nvPr>
+            <p:ph type="body" idx="1"/>
+          </p:nvPr>
+        </p:nvSpPr>
+        <p:spPr/>
+        <p:txBody>
+          <a:bodyPr/>
+          <a:lstStyle/>
+          <a:p>
+            <a:r>
+              <a:rPr lang="en-ID" dirty="0" smtClean="0"/>
+              <a:t>~2 means </a:t>
+            </a:r>
+            <a:r>
+              <a:rPr lang="en-ID" b="1" dirty="0" smtClean="0"/>
+              <a:t>up two levels in the hierarchy</a:t>
+            </a:r>
+            <a:r>
+              <a:rPr lang="en-ID" dirty="0" smtClean="0"/>
+              <a:t>, via the first parent if a commit has more than one parent</a:t>
+            </a:r>
+          </a:p>
+          <a:p>
+            <a:r>
+              <a:rPr lang="en-ID" dirty="0" smtClean="0"/>
+              <a:t>^2 means </a:t>
+            </a:r>
+            <a:r>
+              <a:rPr lang="en-ID" b="1" dirty="0" smtClean="0"/>
+              <a:t>the second parent</a:t>
+            </a:r>
+            <a:r>
+              <a:rPr lang="en-ID" dirty="0" smtClean="0"/>
+              <a:t> where a commit has more than one parent (i.e. because it's a merge)</a:t>
+            </a:r>
+          </a:p>
+          <a:p>
+            <a:endParaRPr lang="en-US" dirty="0"/>
+          </a:p>
+        </p:txBody>
+      </p:sp>
+      <p:sp>
+        <p:nvSpPr>
+          <p:cNvPr id="4" name="Slide Number Placeholder 3"/>
+          <p:cNvSpPr>
+            <a:spLocks noGrp="1"/>
+          </p:cNvSpPr>
+          <p:nvPr>
+            <p:ph type="sldNum" sz="quarter" idx="10"/>
+          </p:nvPr>
+        </p:nvSpPr>
+        <p:spPr/>
+        <p:txBody>
+          <a:bodyPr/>
+          <a:lstStyle/>
+          <a:p>
+            <a:fld id="{7959948B-77FA-4B75-B65F-C5051F11C89F}" type="slidenum">
+              <a:rPr lang="en-US" smtClean="0"/>
+              <a:t>8</a:t>
+            </a:fld>
+            <a:endParaRPr lang="en-US"/>
+          </a:p>
+        </p:txBody>
+      </p:sp>
+    </p:spTree>
+    <p:extLst>
+      <p:ext uri="{BB962C8B-B14F-4D97-AF65-F5344CB8AC3E}">
+        <p14:creationId xmlns:p14="http://schemas.microsoft.com/office/powerpoint/2010/main" val="2642856106"/>
+      </p:ext>
+    </p:extLst>
+  </p:cSld>
+  <p:clrMapOvr>
+    <a:masterClrMapping/>
+  </p:clrMapOvr>
+</p:notes>
+</file>
+
+<file path=ppt/notesSlides/notesSlide9.xml><?xml version="1.0" encoding="utf-8"?>
+<p:notes xmlns:a="http://schemas.openxmlformats.org/drawingml/2006/main" xmlns:r="http://schemas.openxmlformats.org/officeDocument/2006/relationships" xmlns:p="http://schemas.openxmlformats.org/presentationml/2006/main">
+  <p:cSld>
+    <p:spTree>
+      <p:nvGrpSpPr>
+        <p:cNvPr id="1" name=""/>
+        <p:cNvGrpSpPr/>
+        <p:nvPr/>
+      </p:nvGrpSpPr>
+      <p:grpSpPr>
+        <a:xfrm>
+          <a:off x="0" y="0"/>
+          <a:ext cx="0" cy="0"/>
+          <a:chOff x="0" y="0"/>
+          <a:chExt cx="0" cy="0"/>
+        </a:xfrm>
+      </p:grpSpPr>
+      <p:sp>
+        <p:nvSpPr>
+          <p:cNvPr id="2" name="Slide Image Placeholder 1"/>
+          <p:cNvSpPr>
+            <a:spLocks noGrp="1" noRot="1" noChangeAspect="1"/>
+          </p:cNvSpPr>
+          <p:nvPr>
+            <p:ph type="sldImg"/>
+          </p:nvPr>
+        </p:nvSpPr>
+        <p:spPr/>
+      </p:sp>
+      <p:sp>
+        <p:nvSpPr>
+          <p:cNvPr id="3" name="Notes Placeholder 2"/>
+          <p:cNvSpPr>
+            <a:spLocks noGrp="1"/>
+          </p:cNvSpPr>
+          <p:nvPr>
+            <p:ph type="body" idx="1"/>
+          </p:nvPr>
+        </p:nvSpPr>
+        <p:spPr/>
+        <p:txBody>
+          <a:bodyPr/>
+          <a:lstStyle/>
+          <a:p>
+            <a:endParaRPr lang="en-US" dirty="0"/>
+          </a:p>
+        </p:txBody>
+      </p:sp>
+      <p:sp>
+        <p:nvSpPr>
+          <p:cNvPr id="4" name="Slide Number Placeholder 3"/>
+          <p:cNvSpPr>
+            <a:spLocks noGrp="1"/>
+          </p:cNvSpPr>
+          <p:nvPr>
+            <p:ph type="sldNum" sz="quarter" idx="10"/>
+          </p:nvPr>
+        </p:nvSpPr>
+        <p:spPr/>
+        <p:txBody>
+          <a:bodyPr/>
+          <a:lstStyle/>
+          <a:p>
+            <a:fld id="{7959948B-77FA-4B75-B65F-C5051F11C89F}" type="slidenum">
+              <a:rPr lang="en-US" smtClean="0"/>
+              <a:t>9</a:t>
             </a:fld>
             <a:endParaRPr lang="en-US"/>
           </a:p>
@@ -1155,7 +1648,7 @@
           <a:p>
             <a:fld id="{0C0B920D-9F26-4AE8-900D-2A69C73BB646}" type="datetimeFigureOut">
               <a:rPr lang="en-US" smtClean="0"/>
-              <a:t>10/26/2016</a:t>
+              <a:t>11/3/2016</a:t>
             </a:fld>
             <a:endParaRPr lang="en-US"/>
           </a:p>
@@ -1409,7 +1902,7 @@
           <a:p>
             <a:fld id="{0C0B920D-9F26-4AE8-900D-2A69C73BB646}" type="datetimeFigureOut">
               <a:rPr lang="en-US" smtClean="0"/>
-              <a:t>10/26/2016</a:t>
+              <a:t>11/3/2016</a:t>
             </a:fld>
             <a:endParaRPr lang="en-US"/>
           </a:p>
@@ -1647,7 +2140,7 @@
           <a:p>
             <a:fld id="{0C0B920D-9F26-4AE8-900D-2A69C73BB646}" type="datetimeFigureOut">
               <a:rPr lang="en-US" smtClean="0"/>
-              <a:t>10/26/2016</a:t>
+              <a:t>11/3/2016</a:t>
             </a:fld>
             <a:endParaRPr lang="en-US"/>
           </a:p>
@@ -1968,7 +2461,7 @@
           <a:p>
             <a:fld id="{0C0B920D-9F26-4AE8-900D-2A69C73BB646}" type="datetimeFigureOut">
               <a:rPr lang="en-US" smtClean="0"/>
-              <a:t>10/26/2016</a:t>
+              <a:t>11/3/2016</a:t>
             </a:fld>
             <a:endParaRPr lang="en-US"/>
           </a:p>
@@ -2234,7 +2727,7 @@
           <a:p>
             <a:fld id="{0C0B920D-9F26-4AE8-900D-2A69C73BB646}" type="datetimeFigureOut">
               <a:rPr lang="en-US" smtClean="0"/>
-              <a:t>10/26/2016</a:t>
+              <a:t>11/3/2016</a:t>
             </a:fld>
             <a:endParaRPr lang="en-US"/>
           </a:p>
@@ -2513,7 +3006,7 @@
           <a:p>
             <a:fld id="{0C0B920D-9F26-4AE8-900D-2A69C73BB646}" type="datetimeFigureOut">
               <a:rPr lang="en-US" smtClean="0"/>
-              <a:t>10/26/2016</a:t>
+              <a:t>11/3/2016</a:t>
             </a:fld>
             <a:endParaRPr lang="en-US"/>
           </a:p>
@@ -2933,7 +3426,7 @@
           <p:nvPr/>
         </p:nvPicPr>
         <p:blipFill>
-          <a:blip r:embed="rId2" cstate="print">
+          <a:blip r:embed="rId3" cstate="print">
             <a:extLst>
               <a:ext uri="{28A0092B-C50C-407E-A947-70E740481C1C}">
                 <a14:useLocalDpi xmlns:a14="http://schemas.microsoft.com/office/drawing/2010/main" val="0"/>
@@ -3077,7 +3570,7 @@
           <p:nvPr/>
         </p:nvPicPr>
         <p:blipFill>
-          <a:blip r:embed="rId3">
+          <a:blip r:embed="rId4">
             <a:extLst>
               <a:ext uri="{28A0092B-C50C-407E-A947-70E740481C1C}">
                 <a14:useLocalDpi xmlns:a14="http://schemas.microsoft.com/office/drawing/2010/main" val="0"/>
@@ -3197,7 +3690,7 @@
             <a:r>
               <a:rPr lang="en-ID" dirty="0" smtClean="0">
                 <a:sym typeface="Wingdings" panose="05000000000000000000" pitchFamily="2" charset="2"/>
-                <a:hlinkClick r:id="rId2"/>
+                <a:hlinkClick r:id="rId3"/>
               </a:rPr>
               <a:t>https://try.github.io/</a:t>
             </a:r>
@@ -3238,7 +3731,7 @@
           <p:nvPr/>
         </p:nvPicPr>
         <p:blipFill>
-          <a:blip r:embed="rId3">
+          <a:blip r:embed="rId4">
             <a:extLst>
               <a:ext uri="{28A0092B-C50C-407E-A947-70E740481C1C}">
                 <a14:useLocalDpi xmlns:a14="http://schemas.microsoft.com/office/drawing/2010/main" val="0"/>
@@ -3772,15 +4265,7 @@
           <a:p>
             <a:r>
               <a:rPr lang="en-ID" b="1" dirty="0" smtClean="0"/>
-              <a:t>Why </a:t>
-            </a:r>
-            <a:r>
-              <a:rPr lang="en-ID" b="1" dirty="0" smtClean="0"/>
-              <a:t>we want </a:t>
-            </a:r>
-            <a:r>
-              <a:rPr lang="en-ID" b="1" dirty="0" smtClean="0"/>
-              <a:t>to alter </a:t>
+              <a:t>Why we want to alter </a:t>
             </a:r>
             <a:r>
               <a:rPr lang="en-ID" b="1" dirty="0"/>
@@ -4371,7 +4856,7 @@
         </p:nvSpPr>
         <p:spPr>
           <a:xfrm>
-            <a:off x="475756" y="1125495"/>
+            <a:off x="325244" y="1125495"/>
             <a:ext cx="2592287" cy="276999"/>
           </a:xfrm>
           <a:prstGeom prst="rect">
@@ -4410,9 +4895,12 @@
                 <a:latin typeface="Courier New" panose="02070309020205020404" pitchFamily="49" charset="0"/>
                 <a:cs typeface="Courier New" panose="02070309020205020404" pitchFamily="49" charset="0"/>
               </a:rPr>
-              <a:t>git rebase -i</a:t>
-            </a:r>
-            <a:endParaRPr lang="en-US" sz="1200" dirty="0"/>
+              <a:t>git rebase –i </a:t>
+            </a:r>
+            <a:r>
+              <a:rPr lang="en-US" sz="1200" dirty="0"/>
+              <a:t>&lt;base&gt;</a:t>
+            </a:r>
           </a:p>
         </p:txBody>
       </p:sp>
@@ -4424,8 +4912,8 @@
         </p:nvSpPr>
         <p:spPr>
           <a:xfrm>
-            <a:off x="3785957" y="1125495"/>
-            <a:ext cx="2595371" cy="276999"/>
+            <a:off x="3425917" y="1125495"/>
+            <a:ext cx="2955411" cy="276999"/>
           </a:xfrm>
           <a:prstGeom prst="rect">
             <a:avLst/>
@@ -4463,9 +4951,12 @@
                 <a:latin typeface="Courier New" panose="02070309020205020404" pitchFamily="49" charset="0"/>
                 <a:cs typeface="Courier New" panose="02070309020205020404" pitchFamily="49" charset="0"/>
               </a:rPr>
-              <a:t>git rebase --interactive</a:t>
-            </a:r>
-            <a:endParaRPr lang="en-US" sz="1200" dirty="0"/>
+              <a:t>git rebase –interactive </a:t>
+            </a:r>
+            <a:r>
+              <a:rPr lang="en-US" sz="1200" dirty="0"/>
+              <a:t>&lt;base&gt;</a:t>
+            </a:r>
           </a:p>
         </p:txBody>
       </p:sp>
@@ -4477,7 +4968,7 @@
         </p:nvSpPr>
         <p:spPr>
           <a:xfrm>
-            <a:off x="3240830" y="1079328"/>
+            <a:off x="2937406" y="1079328"/>
             <a:ext cx="386644" cy="369332"/>
           </a:xfrm>
           <a:prstGeom prst="rect">
@@ -4486,7 +4977,7 @@
           <a:noFill/>
         </p:spPr>
         <p:txBody>
-          <a:bodyPr wrap="none" rtlCol="0">
+          <a:bodyPr wrap="square" rtlCol="0">
             <a:spAutoFit/>
           </a:bodyPr>
           <a:lstStyle/>
@@ -4507,7 +4998,7 @@
         </p:nvSpPr>
         <p:spPr>
           <a:xfrm>
-            <a:off x="475756" y="756163"/>
+            <a:off x="322844" y="744076"/>
             <a:ext cx="3001206" cy="369332"/>
           </a:xfrm>
           <a:prstGeom prst="rect">
@@ -4551,7 +5042,7 @@
         </p:blipFill>
         <p:spPr>
           <a:xfrm>
-            <a:off x="583568" y="2790968"/>
+            <a:off x="548680" y="2786177"/>
             <a:ext cx="6248934" cy="1515945"/>
           </a:xfrm>
           <a:prstGeom prst="rect">
@@ -4559,88 +5050,190 @@
           </a:prstGeom>
         </p:spPr>
       </p:pic>
-      <p:cxnSp>
-        <p:nvCxnSpPr>
-          <p:cNvPr id="14" name="Straight Arrow Connector 13"/>
-          <p:cNvCxnSpPr/>
+      <p:sp>
+        <p:nvSpPr>
+          <p:cNvPr id="19" name="TextBox 18"/>
+          <p:cNvSpPr txBox="1"/>
           <p:nvPr/>
-        </p:nvCxnSpPr>
-        <p:spPr>
-          <a:xfrm>
-            <a:off x="116632" y="3147814"/>
-            <a:ext cx="504056" cy="0"/>
-          </a:xfrm>
-          <a:prstGeom prst="straightConnector1">
-            <a:avLst/>
-          </a:prstGeom>
+        </p:nvSpPr>
+        <p:spPr>
+          <a:xfrm>
+            <a:off x="3425917" y="756163"/>
+            <a:ext cx="2535246" cy="369332"/>
+          </a:xfrm>
+          <a:prstGeom prst="rect">
+            <a:avLst/>
+          </a:prstGeom>
+          <a:noFill/>
+        </p:spPr>
+        <p:txBody>
+          <a:bodyPr wrap="none" rtlCol="0">
+            <a:spAutoFit/>
+          </a:bodyPr>
+          <a:lstStyle/>
+          <a:p>
+            <a:r>
+              <a:rPr lang="en-ID" dirty="0" smtClean="0"/>
+              <a:t>Command (written form)</a:t>
+            </a:r>
+            <a:endParaRPr lang="en-US" dirty="0"/>
+          </a:p>
+        </p:txBody>
+      </p:sp>
+      <p:sp>
+        <p:nvSpPr>
+          <p:cNvPr id="10" name="5-Point Star 9"/>
+          <p:cNvSpPr/>
+          <p:nvPr/>
+        </p:nvSpPr>
+        <p:spPr>
+          <a:xfrm>
+            <a:off x="337760" y="3067568"/>
+            <a:ext cx="144016" cy="144016"/>
+          </a:xfrm>
+          <a:prstGeom prst="star5">
+            <a:avLst/>
+          </a:prstGeom>
+          <a:solidFill>
+            <a:srgbClr val="FFC000"/>
+          </a:solidFill>
           <a:ln>
             <a:solidFill>
-              <a:srgbClr val="C00000"/>
+              <a:srgbClr val="7030A0"/>
             </a:solidFill>
-            <a:tailEnd type="triangle"/>
           </a:ln>
         </p:spPr>
         <p:style>
-          <a:lnRef idx="1">
-            <a:schemeClr val="accent1"/>
+          <a:lnRef idx="2">
+            <a:schemeClr val="accent1">
+              <a:shade val="50000"/>
+            </a:schemeClr>
           </a:lnRef>
-          <a:fillRef idx="0">
+          <a:fillRef idx="1">
             <a:schemeClr val="accent1"/>
           </a:fillRef>
           <a:effectRef idx="0">
             <a:schemeClr val="accent1"/>
           </a:effectRef>
           <a:fontRef idx="minor">
-            <a:schemeClr val="tx1"/>
+            <a:schemeClr val="lt1"/>
           </a:fontRef>
         </p:style>
-      </p:cxnSp>
-      <p:cxnSp>
-        <p:nvCxnSpPr>
-          <p:cNvPr id="16" name="Straight Arrow Connector 15"/>
-          <p:cNvCxnSpPr/>
+        <p:txBody>
+          <a:bodyPr rtlCol="0" anchor="ctr"/>
+          <a:lstStyle/>
+          <a:p>
+            <a:pPr algn="ctr"/>
+            <a:endParaRPr lang="en-US"/>
+          </a:p>
+        </p:txBody>
+      </p:sp>
+      <p:sp>
+        <p:nvSpPr>
+          <p:cNvPr id="17" name="5-Point Star 16"/>
+          <p:cNvSpPr/>
           <p:nvPr/>
-        </p:nvCxnSpPr>
-        <p:spPr>
-          <a:xfrm>
-            <a:off x="116632" y="3548940"/>
-            <a:ext cx="504056" cy="0"/>
-          </a:xfrm>
-          <a:prstGeom prst="straightConnector1">
-            <a:avLst/>
-          </a:prstGeom>
+        </p:nvSpPr>
+        <p:spPr>
+          <a:xfrm>
+            <a:off x="332656" y="3472142"/>
+            <a:ext cx="144016" cy="144016"/>
+          </a:xfrm>
+          <a:prstGeom prst="star5">
+            <a:avLst/>
+          </a:prstGeom>
+          <a:solidFill>
+            <a:srgbClr val="FFC000"/>
+          </a:solidFill>
           <a:ln>
             <a:solidFill>
-              <a:srgbClr val="C00000"/>
+              <a:srgbClr val="7030A0"/>
             </a:solidFill>
-            <a:tailEnd type="triangle"/>
           </a:ln>
         </p:spPr>
         <p:style>
-          <a:lnRef idx="1">
-            <a:schemeClr val="accent1"/>
+          <a:lnRef idx="2">
+            <a:schemeClr val="accent1">
+              <a:shade val="50000"/>
+            </a:schemeClr>
           </a:lnRef>
-          <a:fillRef idx="0">
+          <a:fillRef idx="1">
             <a:schemeClr val="accent1"/>
           </a:fillRef>
           <a:effectRef idx="0">
             <a:schemeClr val="accent1"/>
           </a:effectRef>
           <a:fontRef idx="minor">
-            <a:schemeClr val="tx1"/>
+            <a:schemeClr val="lt1"/>
           </a:fontRef>
         </p:style>
-      </p:cxnSp>
-      <p:sp>
-        <p:nvSpPr>
-          <p:cNvPr id="19" name="TextBox 18"/>
+        <p:txBody>
+          <a:bodyPr rtlCol="0" anchor="ctr"/>
+          <a:lstStyle/>
+          <a:p>
+            <a:pPr algn="ctr"/>
+            <a:endParaRPr lang="en-US"/>
+          </a:p>
+        </p:txBody>
+      </p:sp>
+      <p:sp>
+        <p:nvSpPr>
+          <p:cNvPr id="18" name="5-Point Star 17"/>
+          <p:cNvSpPr/>
+          <p:nvPr/>
+        </p:nvSpPr>
+        <p:spPr>
+          <a:xfrm>
+            <a:off x="4549524" y="4443958"/>
+            <a:ext cx="144016" cy="144016"/>
+          </a:xfrm>
+          <a:prstGeom prst="star5">
+            <a:avLst/>
+          </a:prstGeom>
+          <a:solidFill>
+            <a:srgbClr val="FFC000"/>
+          </a:solidFill>
+          <a:ln>
+            <a:solidFill>
+              <a:srgbClr val="7030A0"/>
+            </a:solidFill>
+          </a:ln>
+        </p:spPr>
+        <p:style>
+          <a:lnRef idx="2">
+            <a:schemeClr val="accent1">
+              <a:shade val="50000"/>
+            </a:schemeClr>
+          </a:lnRef>
+          <a:fillRef idx="1">
+            <a:schemeClr val="accent1"/>
+          </a:fillRef>
+          <a:effectRef idx="0">
+            <a:schemeClr val="accent1"/>
+          </a:effectRef>
+          <a:fontRef idx="minor">
+            <a:schemeClr val="lt1"/>
+          </a:fontRef>
+        </p:style>
+        <p:txBody>
+          <a:bodyPr rtlCol="0" anchor="ctr"/>
+          <a:lstStyle/>
+          <a:p>
+            <a:pPr algn="ctr"/>
+            <a:endParaRPr lang="en-US"/>
+          </a:p>
+        </p:txBody>
+      </p:sp>
+      <p:sp>
+        <p:nvSpPr>
+          <p:cNvPr id="13" name="TextBox 12"/>
           <p:cNvSpPr txBox="1"/>
           <p:nvPr/>
         </p:nvSpPr>
         <p:spPr>
           <a:xfrm>
-            <a:off x="3785957" y="756163"/>
-            <a:ext cx="2535246" cy="369332"/>
+            <a:off x="4693540" y="4400550"/>
+            <a:ext cx="1010213" cy="230832"/>
           </a:xfrm>
           <a:prstGeom prst="rect">
             <a:avLst/>
@@ -4654,18 +5247,10 @@
           <a:lstStyle/>
           <a:p>
             <a:r>
-              <a:rPr lang="en-ID" dirty="0" smtClean="0"/>
-              <a:t>Command </a:t>
-            </a:r>
-            <a:r>
-              <a:rPr lang="en-ID" dirty="0" smtClean="0"/>
-              <a:t>(written </a:t>
-            </a:r>
-            <a:r>
-              <a:rPr lang="en-ID" dirty="0" smtClean="0"/>
-              <a:t>form)</a:t>
-            </a:r>
-            <a:endParaRPr lang="en-US" dirty="0"/>
+              <a:rPr lang="en-ID" sz="900" dirty="0" smtClean="0"/>
+              <a:t>Our current focus</a:t>
+            </a:r>
+            <a:endParaRPr lang="en-US" sz="900" dirty="0"/>
           </a:p>
         </p:txBody>
       </p:sp>
@@ -4708,20 +5293,142 @@
       </p:grpSpPr>
       <p:sp>
         <p:nvSpPr>
-          <p:cNvPr id="11" name="TextBox 10"/>
+          <p:cNvPr id="8" name="Rectangle 7"/>
+          <p:cNvSpPr/>
+          <p:nvPr/>
+        </p:nvSpPr>
+        <p:spPr>
+          <a:xfrm>
+            <a:off x="4869160" y="1923678"/>
+            <a:ext cx="1988840" cy="646331"/>
+          </a:xfrm>
+          <a:prstGeom prst="rect">
+            <a:avLst/>
+          </a:prstGeom>
+        </p:spPr>
+        <p:txBody>
+          <a:bodyPr wrap="square">
+            <a:spAutoFit/>
+          </a:bodyPr>
+          <a:lstStyle/>
+          <a:p>
+            <a:r>
+              <a:rPr lang="en-US" sz="1200" dirty="0">
+                <a:solidFill>
+                  <a:srgbClr val="7030A0"/>
+                </a:solidFill>
+                <a:latin typeface="Arial" panose="020B0604020202020204" pitchFamily="34" charset="0"/>
+                <a:cs typeface="Arial" panose="020B0604020202020204" pitchFamily="34" charset="0"/>
+              </a:rPr>
+              <a:t>these commands will</a:t>
+            </a:r>
+          </a:p>
+          <a:p>
+            <a:r>
+              <a:rPr lang="en-US" sz="1200" dirty="0">
+                <a:solidFill>
+                  <a:srgbClr val="7030A0"/>
+                </a:solidFill>
+                <a:latin typeface="Arial" panose="020B0604020202020204" pitchFamily="34" charset="0"/>
+                <a:cs typeface="Arial" panose="020B0604020202020204" pitchFamily="34" charset="0"/>
+              </a:rPr>
+              <a:t>execute when you close</a:t>
+            </a:r>
+          </a:p>
+          <a:p>
+            <a:r>
+              <a:rPr lang="en-US" sz="1200" dirty="0">
+                <a:solidFill>
+                  <a:srgbClr val="7030A0"/>
+                </a:solidFill>
+                <a:latin typeface="Arial" panose="020B0604020202020204" pitchFamily="34" charset="0"/>
+                <a:cs typeface="Arial" panose="020B0604020202020204" pitchFamily="34" charset="0"/>
+              </a:rPr>
+              <a:t>the editor</a:t>
+            </a:r>
+            <a:endParaRPr lang="en-US" sz="1200" dirty="0">
+              <a:solidFill>
+                <a:srgbClr val="7030A0"/>
+              </a:solidFill>
+            </a:endParaRPr>
+          </a:p>
+        </p:txBody>
+      </p:sp>
+      <p:sp>
+        <p:nvSpPr>
+          <p:cNvPr id="9" name="Rectangle 8"/>
+          <p:cNvSpPr/>
+          <p:nvPr/>
+        </p:nvSpPr>
+        <p:spPr>
+          <a:xfrm>
+            <a:off x="4859013" y="2639439"/>
+            <a:ext cx="1697757" cy="461665"/>
+          </a:xfrm>
+          <a:prstGeom prst="rect">
+            <a:avLst/>
+          </a:prstGeom>
+        </p:spPr>
+        <p:txBody>
+          <a:bodyPr wrap="square">
+            <a:spAutoFit/>
+          </a:bodyPr>
+          <a:lstStyle/>
+          <a:p>
+            <a:r>
+              <a:rPr lang="en-US" sz="1200" dirty="0">
+                <a:solidFill>
+                  <a:srgbClr val="7030A0"/>
+                </a:solidFill>
+                <a:latin typeface="Arial" panose="020B0604020202020204" pitchFamily="34" charset="0"/>
+                <a:cs typeface="Arial" panose="020B0604020202020204" pitchFamily="34" charset="0"/>
+              </a:rPr>
+              <a:t>you can replace them</a:t>
+            </a:r>
+          </a:p>
+          <a:p>
+            <a:r>
+              <a:rPr lang="en-US" sz="1200" dirty="0">
+                <a:solidFill>
+                  <a:srgbClr val="7030A0"/>
+                </a:solidFill>
+                <a:latin typeface="Arial" panose="020B0604020202020204" pitchFamily="34" charset="0"/>
+                <a:cs typeface="Arial" panose="020B0604020202020204" pitchFamily="34" charset="0"/>
+              </a:rPr>
+              <a:t>with any of these</a:t>
+            </a:r>
+          </a:p>
+        </p:txBody>
+      </p:sp>
+      <p:sp>
+        <p:nvSpPr>
+          <p:cNvPr id="10" name="TextBox 9"/>
           <p:cNvSpPr txBox="1"/>
           <p:nvPr/>
         </p:nvSpPr>
         <p:spPr>
           <a:xfrm>
-            <a:off x="485056" y="923950"/>
-            <a:ext cx="5680248" cy="1323439"/>
+            <a:off x="328950" y="1462376"/>
+            <a:ext cx="4540210" cy="2492990"/>
           </a:xfrm>
           <a:prstGeom prst="rect">
             <a:avLst/>
           </a:prstGeom>
-          <a:noFill/>
-        </p:spPr>
+        </p:spPr>
+        <p:style>
+          <a:lnRef idx="0">
+            <a:schemeClr val="dk1"/>
+          </a:lnRef>
+          <a:fillRef idx="3">
+            <a:schemeClr val="dk1"/>
+          </a:fillRef>
+          <a:effectRef idx="3">
+            <a:schemeClr val="dk1"/>
+          </a:effectRef>
+          <a:fontRef idx="minor">
+            <a:schemeClr val="lt1"/>
+          </a:fontRef>
+        </p:style>
         <p:txBody>
           <a:bodyPr wrap="square" rtlCol="0">
             <a:spAutoFit/>
@@ -4729,63 +5436,134 @@
           <a:lstStyle/>
           <a:p>
             <a:r>
-              <a:rPr lang="en-ID" sz="1600" dirty="0" smtClean="0"/>
-              <a:t>Exercise </a:t>
-            </a:r>
-            <a:r>
-              <a:rPr lang="en-ID" sz="1600" dirty="0" smtClean="0"/>
-              <a:t>1</a:t>
-            </a:r>
-          </a:p>
-          <a:p>
-            <a:pPr marL="285750" indent="-285750">
-              <a:buFont typeface="Arial" panose="020B0604020202020204" pitchFamily="34" charset="0"/>
-              <a:buChar char="•"/>
-            </a:pPr>
-            <a:r>
-              <a:rPr lang="en-ID" sz="1600" dirty="0" smtClean="0"/>
-              <a:t>Clone you branch from Workshop I</a:t>
-            </a:r>
-          </a:p>
-          <a:p>
-            <a:pPr marL="285750" indent="-285750">
-              <a:buFont typeface="Arial" panose="020B0604020202020204" pitchFamily="34" charset="0"/>
-              <a:buChar char="•"/>
-            </a:pPr>
-            <a:r>
-              <a:rPr lang="en-ID" sz="1600" dirty="0" smtClean="0"/>
-              <a:t>Edit something and create multiple commits</a:t>
-            </a:r>
-          </a:p>
-          <a:p>
-            <a:pPr marL="285750" indent="-285750">
-              <a:buFont typeface="Arial" panose="020B0604020202020204" pitchFamily="34" charset="0"/>
-              <a:buChar char="•"/>
-            </a:pPr>
-            <a:r>
-              <a:rPr lang="en-ID" sz="1600" i="1" dirty="0"/>
-              <a:t>S</a:t>
-            </a:r>
-            <a:r>
-              <a:rPr lang="en-ID" sz="1600" i="1" dirty="0" smtClean="0"/>
-              <a:t>quash some commit together</a:t>
-            </a:r>
-          </a:p>
-          <a:p>
-            <a:pPr marL="285750" indent="-285750">
-              <a:buFont typeface="Arial" panose="020B0604020202020204" pitchFamily="34" charset="0"/>
-              <a:buChar char="•"/>
-            </a:pPr>
-            <a:r>
-              <a:rPr lang="en-ID" sz="1600" dirty="0" smtClean="0"/>
-              <a:t>Publish your branch again</a:t>
-            </a:r>
-          </a:p>
-        </p:txBody>
-      </p:sp>
-      <p:sp>
-        <p:nvSpPr>
-          <p:cNvPr id="6" name="TextBox 5"/>
+              <a:rPr lang="en-ID" sz="1200" dirty="0">
+                <a:latin typeface="Arial" panose="020B0604020202020204" pitchFamily="34" charset="0"/>
+                <a:cs typeface="Arial" panose="020B0604020202020204" pitchFamily="34" charset="0"/>
+              </a:rPr>
+              <a:t>pick 9629e9b Add capybaras to index.</a:t>
+            </a:r>
+          </a:p>
+          <a:p>
+            <a:r>
+              <a:rPr lang="pt-BR" sz="1200" dirty="0">
+                <a:latin typeface="Arial" panose="020B0604020202020204" pitchFamily="34" charset="0"/>
+                <a:cs typeface="Arial" panose="020B0604020202020204" pitchFamily="34" charset="0"/>
+              </a:rPr>
+              <a:t>pick 21e37b1 Add capybaras page.</a:t>
+            </a:r>
+          </a:p>
+          <a:p>
+            <a:r>
+              <a:rPr lang="en-ID" sz="1200" dirty="0">
+                <a:latin typeface="Arial" panose="020B0604020202020204" pitchFamily="34" charset="0"/>
+                <a:cs typeface="Arial" panose="020B0604020202020204" pitchFamily="34" charset="0"/>
+              </a:rPr>
+              <a:t>pick eb7d5a0 Actually, the plural is 'capybara'.</a:t>
+            </a:r>
+          </a:p>
+          <a:p>
+            <a:endParaRPr lang="en-US" sz="1200" dirty="0">
+              <a:latin typeface="Arial" panose="020B0604020202020204" pitchFamily="34" charset="0"/>
+              <a:cs typeface="Arial" panose="020B0604020202020204" pitchFamily="34" charset="0"/>
+            </a:endParaRPr>
+          </a:p>
+          <a:p>
+            <a:r>
+              <a:rPr lang="pt-BR" sz="1200" dirty="0">
+                <a:latin typeface="Arial" panose="020B0604020202020204" pitchFamily="34" charset="0"/>
+                <a:cs typeface="Arial" panose="020B0604020202020204" pitchFamily="34" charset="0"/>
+              </a:rPr>
+              <a:t># Rebase 4202447..eb7d5a0 onto 4202447</a:t>
+            </a:r>
+          </a:p>
+          <a:p>
+            <a:r>
+              <a:rPr lang="en-US" sz="1200" dirty="0">
+                <a:latin typeface="Arial" panose="020B0604020202020204" pitchFamily="34" charset="0"/>
+                <a:cs typeface="Arial" panose="020B0604020202020204" pitchFamily="34" charset="0"/>
+              </a:rPr>
+              <a:t>#</a:t>
+            </a:r>
+          </a:p>
+          <a:p>
+            <a:r>
+              <a:rPr lang="en-US" sz="1200" dirty="0">
+                <a:latin typeface="Arial" panose="020B0604020202020204" pitchFamily="34" charset="0"/>
+                <a:cs typeface="Arial" panose="020B0604020202020204" pitchFamily="34" charset="0"/>
+              </a:rPr>
+              <a:t># Commands:</a:t>
+            </a:r>
+          </a:p>
+          <a:p>
+            <a:r>
+              <a:rPr lang="en-US" sz="1200" dirty="0">
+                <a:latin typeface="Arial" panose="020B0604020202020204" pitchFamily="34" charset="0"/>
+                <a:cs typeface="Arial" panose="020B0604020202020204" pitchFamily="34" charset="0"/>
+              </a:rPr>
+              <a:t># p, pick = use commit</a:t>
+            </a:r>
+          </a:p>
+          <a:p>
+            <a:r>
+              <a:rPr lang="en-ID" sz="1200" dirty="0">
+                <a:latin typeface="Arial" panose="020B0604020202020204" pitchFamily="34" charset="0"/>
+                <a:cs typeface="Arial" panose="020B0604020202020204" pitchFamily="34" charset="0"/>
+              </a:rPr>
+              <a:t># r, reword = use commit, but edit the commit message</a:t>
+            </a:r>
+          </a:p>
+          <a:p>
+            <a:r>
+              <a:rPr lang="en-ID" sz="1200" dirty="0">
+                <a:latin typeface="Arial" panose="020B0604020202020204" pitchFamily="34" charset="0"/>
+                <a:cs typeface="Arial" panose="020B0604020202020204" pitchFamily="34" charset="0"/>
+              </a:rPr>
+              <a:t># e, edit = use commit, but stop for amending</a:t>
+            </a:r>
+          </a:p>
+          <a:p>
+            <a:r>
+              <a:rPr lang="en-ID" sz="1200" dirty="0">
+                <a:latin typeface="Arial" panose="020B0604020202020204" pitchFamily="34" charset="0"/>
+                <a:cs typeface="Arial" panose="020B0604020202020204" pitchFamily="34" charset="0"/>
+              </a:rPr>
+              <a:t># s, squash = use commit, but meld into previous commit</a:t>
+            </a:r>
+          </a:p>
+          <a:p>
+            <a:r>
+              <a:rPr lang="en-ID" sz="1200" dirty="0">
+                <a:latin typeface="Arial" panose="020B0604020202020204" pitchFamily="34" charset="0"/>
+                <a:cs typeface="Arial" panose="020B0604020202020204" pitchFamily="34" charset="0"/>
+              </a:rPr>
+              <a:t># f, fixup = like "squash", but discard this commit's log message</a:t>
+            </a:r>
+          </a:p>
+          <a:p>
+            <a:r>
+              <a:rPr lang="en-ID" sz="1200" dirty="0">
+                <a:latin typeface="Arial" panose="020B0604020202020204" pitchFamily="34" charset="0"/>
+                <a:cs typeface="Arial" panose="020B0604020202020204" pitchFamily="34" charset="0"/>
+              </a:rPr>
+              <a:t># x, exec = run command (the rest of the line) using </a:t>
+            </a:r>
+            <a:r>
+              <a:rPr lang="en-ID" sz="1200" dirty="0" smtClean="0">
+                <a:latin typeface="Arial" panose="020B0604020202020204" pitchFamily="34" charset="0"/>
+                <a:cs typeface="Arial" panose="020B0604020202020204" pitchFamily="34" charset="0"/>
+              </a:rPr>
+              <a:t>shell</a:t>
+            </a:r>
+            <a:endParaRPr lang="en-US" sz="1200" dirty="0">
+              <a:latin typeface="Arial" panose="020B0604020202020204" pitchFamily="34" charset="0"/>
+              <a:cs typeface="Arial" panose="020B0604020202020204" pitchFamily="34" charset="0"/>
+            </a:endParaRPr>
+          </a:p>
+        </p:txBody>
+      </p:sp>
+      <p:sp>
+        <p:nvSpPr>
+          <p:cNvPr id="11" name="TextBox 10"/>
           <p:cNvSpPr txBox="1"/>
           <p:nvPr/>
         </p:nvSpPr>
@@ -4812,8 +5590,290 @@
                 </a:solidFill>
                 <a:latin typeface="Bookman Old Style" panose="02050604050505020204" pitchFamily="18" charset="0"/>
               </a:rPr>
-              <a:t>CDC – git interactive rebase / </a:t>
-            </a:r>
+              <a:t>CDC – git interactive rebase / Overview</a:t>
+            </a:r>
+            <a:endParaRPr lang="en-US" b="1" dirty="0">
+              <a:solidFill>
+                <a:srgbClr val="392900"/>
+              </a:solidFill>
+              <a:latin typeface="Bookman Old Style" panose="02050604050505020204" pitchFamily="18" charset="0"/>
+            </a:endParaRPr>
+          </a:p>
+        </p:txBody>
+      </p:sp>
+      <p:cxnSp>
+        <p:nvCxnSpPr>
+          <p:cNvPr id="15" name="Straight Arrow Connector 14"/>
+          <p:cNvCxnSpPr>
+            <a:stCxn id="8" idx="1"/>
+          </p:cNvCxnSpPr>
+          <p:nvPr/>
+        </p:nvCxnSpPr>
+        <p:spPr>
+          <a:xfrm flipH="1" flipV="1">
+            <a:off x="3717032" y="2118650"/>
+            <a:ext cx="1152128" cy="128194"/>
+          </a:xfrm>
+          <a:prstGeom prst="straightConnector1">
+            <a:avLst/>
+          </a:prstGeom>
+          <a:ln w="34925">
+            <a:headEnd w="lg" len="lg"/>
+            <a:tailEnd type="triangle"/>
+          </a:ln>
+        </p:spPr>
+        <p:style>
+          <a:lnRef idx="3">
+            <a:schemeClr val="accent4"/>
+          </a:lnRef>
+          <a:fillRef idx="0">
+            <a:schemeClr val="accent4"/>
+          </a:fillRef>
+          <a:effectRef idx="2">
+            <a:schemeClr val="accent4"/>
+          </a:effectRef>
+          <a:fontRef idx="minor">
+            <a:schemeClr val="tx1"/>
+          </a:fontRef>
+        </p:style>
+      </p:cxnSp>
+      <p:cxnSp>
+        <p:nvCxnSpPr>
+          <p:cNvPr id="21" name="Straight Arrow Connector 20"/>
+          <p:cNvCxnSpPr/>
+          <p:nvPr/>
+        </p:nvCxnSpPr>
+        <p:spPr>
+          <a:xfrm flipH="1">
+            <a:off x="4293096" y="3003073"/>
+            <a:ext cx="576064" cy="433063"/>
+          </a:xfrm>
+          <a:prstGeom prst="straightConnector1">
+            <a:avLst/>
+          </a:prstGeom>
+          <a:ln w="34925">
+            <a:headEnd w="lg" len="lg"/>
+            <a:tailEnd type="triangle"/>
+          </a:ln>
+        </p:spPr>
+        <p:style>
+          <a:lnRef idx="3">
+            <a:schemeClr val="accent4"/>
+          </a:lnRef>
+          <a:fillRef idx="0">
+            <a:schemeClr val="accent4"/>
+          </a:fillRef>
+          <a:effectRef idx="2">
+            <a:schemeClr val="accent4"/>
+          </a:effectRef>
+          <a:fontRef idx="minor">
+            <a:schemeClr val="tx1"/>
+          </a:fontRef>
+        </p:style>
+      </p:cxnSp>
+      <p:sp>
+        <p:nvSpPr>
+          <p:cNvPr id="28" name="TextBox 27"/>
+          <p:cNvSpPr txBox="1"/>
+          <p:nvPr/>
+        </p:nvSpPr>
+        <p:spPr>
+          <a:xfrm>
+            <a:off x="328950" y="905150"/>
+            <a:ext cx="2592287" cy="276999"/>
+          </a:xfrm>
+          <a:prstGeom prst="rect">
+            <a:avLst/>
+          </a:prstGeom>
+        </p:spPr>
+        <p:style>
+          <a:lnRef idx="0">
+            <a:schemeClr val="dk1"/>
+          </a:lnRef>
+          <a:fillRef idx="3">
+            <a:schemeClr val="dk1"/>
+          </a:fillRef>
+          <a:effectRef idx="3">
+            <a:schemeClr val="dk1"/>
+          </a:effectRef>
+          <a:fontRef idx="minor">
+            <a:schemeClr val="lt1"/>
+          </a:fontRef>
+        </p:style>
+        <p:txBody>
+          <a:bodyPr wrap="square" rtlCol="0">
+            <a:spAutoFit/>
+          </a:bodyPr>
+          <a:lstStyle/>
+          <a:p>
+            <a:r>
+              <a:rPr lang="en-ID" sz="1200" dirty="0">
+                <a:latin typeface="Courier New" panose="02070309020205020404" pitchFamily="49" charset="0"/>
+                <a:cs typeface="Courier New" panose="02070309020205020404" pitchFamily="49" charset="0"/>
+              </a:rPr>
+              <a:t>$</a:t>
+            </a:r>
+            <a:r>
+              <a:rPr lang="en-ID" sz="1200" dirty="0" smtClean="0">
+                <a:latin typeface="Courier New" panose="02070309020205020404" pitchFamily="49" charset="0"/>
+                <a:cs typeface="Courier New" panose="02070309020205020404" pitchFamily="49" charset="0"/>
+              </a:rPr>
+              <a:t>git rebase –i </a:t>
+            </a:r>
+            <a:r>
+              <a:rPr lang="en-US" sz="1200" dirty="0" smtClean="0"/>
+              <a:t>HEAD~3</a:t>
+            </a:r>
+            <a:endParaRPr lang="en-US" sz="1200" dirty="0"/>
+          </a:p>
+        </p:txBody>
+      </p:sp>
+      <p:sp>
+        <p:nvSpPr>
+          <p:cNvPr id="33" name="TextBox 32"/>
+          <p:cNvSpPr txBox="1"/>
+          <p:nvPr/>
+        </p:nvSpPr>
+        <p:spPr>
+          <a:xfrm>
+            <a:off x="4848372" y="729291"/>
+            <a:ext cx="1944216" cy="646331"/>
+          </a:xfrm>
+          <a:prstGeom prst="rect">
+            <a:avLst/>
+          </a:prstGeom>
+          <a:noFill/>
+        </p:spPr>
+        <p:txBody>
+          <a:bodyPr wrap="square" rtlCol="0">
+            <a:spAutoFit/>
+          </a:bodyPr>
+          <a:lstStyle/>
+          <a:p>
+            <a:r>
+              <a:rPr lang="en-ID" sz="1200" dirty="0"/>
+              <a:t>“HEAD is a reference to the last commit in the currently checked-out </a:t>
+            </a:r>
+            <a:r>
+              <a:rPr lang="en-ID" sz="1200" dirty="0" smtClean="0"/>
+              <a:t>branch.”</a:t>
+            </a:r>
+            <a:endParaRPr lang="en-US" sz="1200" dirty="0"/>
+          </a:p>
+        </p:txBody>
+      </p:sp>
+      <p:sp>
+        <p:nvSpPr>
+          <p:cNvPr id="35" name="TextBox 34"/>
+          <p:cNvSpPr txBox="1"/>
+          <p:nvPr/>
+        </p:nvSpPr>
+        <p:spPr>
+          <a:xfrm>
+            <a:off x="328950" y="4227934"/>
+            <a:ext cx="2592287" cy="276999"/>
+          </a:xfrm>
+          <a:prstGeom prst="rect">
+            <a:avLst/>
+          </a:prstGeom>
+        </p:spPr>
+        <p:style>
+          <a:lnRef idx="0">
+            <a:schemeClr val="dk1"/>
+          </a:lnRef>
+          <a:fillRef idx="3">
+            <a:schemeClr val="dk1"/>
+          </a:fillRef>
+          <a:effectRef idx="3">
+            <a:schemeClr val="dk1"/>
+          </a:effectRef>
+          <a:fontRef idx="minor">
+            <a:schemeClr val="lt1"/>
+          </a:fontRef>
+        </p:style>
+        <p:txBody>
+          <a:bodyPr wrap="square" rtlCol="0">
+            <a:spAutoFit/>
+          </a:bodyPr>
+          <a:lstStyle/>
+          <a:p>
+            <a:r>
+              <a:rPr lang="en-ID" sz="1200" dirty="0">
+                <a:latin typeface="Courier New" panose="02070309020205020404" pitchFamily="49" charset="0"/>
+                <a:cs typeface="Courier New" panose="02070309020205020404" pitchFamily="49" charset="0"/>
+              </a:rPr>
+              <a:t>$</a:t>
+            </a:r>
+            <a:r>
+              <a:rPr lang="en-ID" sz="1200" dirty="0" smtClean="0">
+                <a:latin typeface="Courier New" panose="02070309020205020404" pitchFamily="49" charset="0"/>
+                <a:cs typeface="Courier New" panose="02070309020205020404" pitchFamily="49" charset="0"/>
+              </a:rPr>
+              <a:t>git log --</a:t>
+            </a:r>
+            <a:r>
+              <a:rPr lang="en-ID" sz="1200" dirty="0" err="1" smtClean="0">
+                <a:latin typeface="Courier New" panose="02070309020205020404" pitchFamily="49" charset="0"/>
+                <a:cs typeface="Courier New" panose="02070309020205020404" pitchFamily="49" charset="0"/>
+              </a:rPr>
+              <a:t>oneline</a:t>
+            </a:r>
+            <a:endParaRPr lang="en-US" sz="1200" dirty="0"/>
+          </a:p>
+        </p:txBody>
+      </p:sp>
+    </p:spTree>
+    <p:extLst>
+      <p:ext uri="{BB962C8B-B14F-4D97-AF65-F5344CB8AC3E}">
+        <p14:creationId xmlns:p14="http://schemas.microsoft.com/office/powerpoint/2010/main" val="3632968652"/>
+      </p:ext>
+    </p:extLst>
+  </p:cSld>
+  <p:clrMapOvr>
+    <a:masterClrMapping/>
+  </p:clrMapOvr>
+</p:sld>
+</file>
+
+<file path=ppt/slides/slide8.xml><?xml version="1.0" encoding="utf-8"?>
+<p:sld xmlns:a="http://schemas.openxmlformats.org/drawingml/2006/main" xmlns:r="http://schemas.openxmlformats.org/officeDocument/2006/relationships" xmlns:p="http://schemas.openxmlformats.org/presentationml/2006/main">
+  <p:cSld>
+    <p:spTree>
+      <p:nvGrpSpPr>
+        <p:cNvPr id="1" name=""/>
+        <p:cNvGrpSpPr/>
+        <p:nvPr/>
+      </p:nvGrpSpPr>
+      <p:grpSpPr>
+        <a:xfrm>
+          <a:off x="0" y="0"/>
+          <a:ext cx="0" cy="0"/>
+          <a:chOff x="0" y="0"/>
+          <a:chExt cx="0" cy="0"/>
+        </a:xfrm>
+      </p:grpSpPr>
+      <p:sp>
+        <p:nvSpPr>
+          <p:cNvPr id="11" name="TextBox 10"/>
+          <p:cNvSpPr txBox="1"/>
+          <p:nvPr/>
+        </p:nvSpPr>
+        <p:spPr>
+          <a:xfrm>
+            <a:off x="332656" y="195486"/>
+            <a:ext cx="6192688" cy="369332"/>
+          </a:xfrm>
+          <a:prstGeom prst="rect">
+            <a:avLst/>
+          </a:prstGeom>
+          <a:noFill/>
+        </p:spPr>
+        <p:txBody>
+          <a:bodyPr wrap="square" rtlCol="0">
+            <a:spAutoFit/>
+          </a:bodyPr>
+          <a:lstStyle/>
+          <a:p>
             <a:r>
               <a:rPr lang="en-ID" b="1" dirty="0" smtClean="0">
                 <a:solidFill>
@@ -4821,7 +5881,7 @@
                 </a:solidFill>
                 <a:latin typeface="Bookman Old Style" panose="02050604050505020204" pitchFamily="18" charset="0"/>
               </a:rPr>
-              <a:t>Practice</a:t>
+              <a:t>CDC – git interactive rebase / Overview</a:t>
             </a:r>
             <a:endParaRPr lang="en-US" b="1" dirty="0">
               <a:solidFill>
@@ -4834,20 +5894,33 @@
       </p:sp>
       <p:sp>
         <p:nvSpPr>
-          <p:cNvPr id="7" name="TextBox 6"/>
+          <p:cNvPr id="28" name="TextBox 27"/>
           <p:cNvSpPr txBox="1"/>
           <p:nvPr/>
         </p:nvSpPr>
         <p:spPr>
           <a:xfrm>
-            <a:off x="485056" y="2634137"/>
-            <a:ext cx="5680248" cy="1323439"/>
+            <a:off x="328950" y="905150"/>
+            <a:ext cx="2592287" cy="276999"/>
           </a:xfrm>
           <a:prstGeom prst="rect">
             <a:avLst/>
           </a:prstGeom>
-          <a:noFill/>
-        </p:spPr>
+        </p:spPr>
+        <p:style>
+          <a:lnRef idx="0">
+            <a:schemeClr val="dk1"/>
+          </a:lnRef>
+          <a:fillRef idx="3">
+            <a:schemeClr val="dk1"/>
+          </a:fillRef>
+          <a:effectRef idx="3">
+            <a:schemeClr val="dk1"/>
+          </a:effectRef>
+          <a:fontRef idx="minor">
+            <a:schemeClr val="lt1"/>
+          </a:fontRef>
+        </p:style>
         <p:txBody>
           <a:bodyPr wrap="square" rtlCol="0">
             <a:spAutoFit/>
@@ -4855,23 +5928,687 @@
           <a:lstStyle/>
           <a:p>
             <a:r>
-              <a:rPr lang="en-ID" sz="1600" dirty="0" smtClean="0"/>
-              <a:t>Exercise </a:t>
-            </a:r>
-            <a:r>
-              <a:rPr lang="en-ID" sz="1600" dirty="0" smtClean="0"/>
-              <a:t>2</a:t>
-            </a:r>
-          </a:p>
+              <a:rPr lang="en-ID" sz="1200" dirty="0">
+                <a:latin typeface="Courier New" panose="02070309020205020404" pitchFamily="49" charset="0"/>
+                <a:cs typeface="Courier New" panose="02070309020205020404" pitchFamily="49" charset="0"/>
+              </a:rPr>
+              <a:t>$</a:t>
+            </a:r>
+            <a:r>
+              <a:rPr lang="en-ID" sz="1200" dirty="0" smtClean="0">
+                <a:latin typeface="Courier New" panose="02070309020205020404" pitchFamily="49" charset="0"/>
+                <a:cs typeface="Courier New" panose="02070309020205020404" pitchFamily="49" charset="0"/>
+              </a:rPr>
+              <a:t>git rebase –i </a:t>
+            </a:r>
+            <a:r>
+              <a:rPr lang="en-US" sz="1200" dirty="0" smtClean="0"/>
+              <a:t>HEAD~3</a:t>
+            </a:r>
+            <a:endParaRPr lang="en-US" sz="1200" dirty="0"/>
+          </a:p>
+        </p:txBody>
+      </p:sp>
+      <p:sp>
+        <p:nvSpPr>
+          <p:cNvPr id="12" name="TextBox 11"/>
+          <p:cNvSpPr txBox="1"/>
+          <p:nvPr/>
+        </p:nvSpPr>
+        <p:spPr>
+          <a:xfrm>
+            <a:off x="359088" y="1275435"/>
+            <a:ext cx="1200970" cy="369332"/>
+          </a:xfrm>
+          <a:prstGeom prst="rect">
+            <a:avLst/>
+          </a:prstGeom>
+          <a:noFill/>
+        </p:spPr>
+        <p:txBody>
+          <a:bodyPr wrap="none" rtlCol="0">
+            <a:spAutoFit/>
+          </a:bodyPr>
+          <a:lstStyle/>
+          <a:p>
+            <a:r>
+              <a:rPr lang="en-ID" b="1" dirty="0" smtClean="0">
+                <a:solidFill>
+                  <a:srgbClr val="C00000"/>
+                </a:solidFill>
+              </a:rPr>
+              <a:t>Hold on!!! </a:t>
+            </a:r>
+            <a:endParaRPr lang="en-US" b="1" dirty="0">
+              <a:solidFill>
+                <a:srgbClr val="C00000"/>
+              </a:solidFill>
+            </a:endParaRPr>
+          </a:p>
+        </p:txBody>
+      </p:sp>
+      <p:sp>
+        <p:nvSpPr>
+          <p:cNvPr id="13" name="TextBox 12"/>
+          <p:cNvSpPr txBox="1"/>
+          <p:nvPr/>
+        </p:nvSpPr>
+        <p:spPr>
+          <a:xfrm>
+            <a:off x="328950" y="1612785"/>
+            <a:ext cx="3139251" cy="369332"/>
+          </a:xfrm>
+          <a:prstGeom prst="rect">
+            <a:avLst/>
+          </a:prstGeom>
+          <a:noFill/>
+        </p:spPr>
+        <p:txBody>
+          <a:bodyPr wrap="square" rtlCol="0">
+            <a:spAutoFit/>
+          </a:bodyPr>
+          <a:lstStyle/>
           <a:p>
             <a:pPr marL="285750" indent="-285750">
               <a:buFont typeface="Arial" panose="020B0604020202020204" pitchFamily="34" charset="0"/>
               <a:buChar char="•"/>
             </a:pPr>
             <a:r>
+              <a:rPr lang="en-ID" dirty="0" smtClean="0"/>
+              <a:t>What does HEAD~3 doing??</a:t>
+            </a:r>
+          </a:p>
+        </p:txBody>
+      </p:sp>
+      <p:pic>
+        <p:nvPicPr>
+          <p:cNvPr id="3" name="Picture 2"/>
+          <p:cNvPicPr>
+            <a:picLocks noChangeAspect="1"/>
+          </p:cNvPicPr>
+          <p:nvPr/>
+        </p:nvPicPr>
+        <p:blipFill>
+          <a:blip r:embed="rId3">
+            <a:extLst>
+              <a:ext uri="{28A0092B-C50C-407E-A947-70E740481C1C}">
+                <a14:useLocalDpi xmlns:a14="http://schemas.microsoft.com/office/drawing/2010/main" val="0"/>
+              </a:ext>
+            </a:extLst>
+          </a:blip>
+          <a:stretch>
+            <a:fillRect/>
+          </a:stretch>
+        </p:blipFill>
+        <p:spPr>
+          <a:xfrm>
+            <a:off x="3468201" y="995454"/>
+            <a:ext cx="3057143" cy="3323809"/>
+          </a:xfrm>
+          <a:prstGeom prst="rect">
+            <a:avLst/>
+          </a:prstGeom>
+        </p:spPr>
+      </p:pic>
+      <p:pic>
+        <p:nvPicPr>
+          <p:cNvPr id="4" name="Picture 3"/>
+          <p:cNvPicPr>
+            <a:picLocks noChangeAspect="1"/>
+          </p:cNvPicPr>
+          <p:nvPr/>
+        </p:nvPicPr>
+        <p:blipFill>
+          <a:blip r:embed="rId4">
+            <a:extLst>
+              <a:ext uri="{28A0092B-C50C-407E-A947-70E740481C1C}">
+                <a14:useLocalDpi xmlns:a14="http://schemas.microsoft.com/office/drawing/2010/main" val="0"/>
+              </a:ext>
+            </a:extLst>
+          </a:blip>
+          <a:stretch>
+            <a:fillRect/>
+          </a:stretch>
+        </p:blipFill>
+        <p:spPr>
+          <a:xfrm>
+            <a:off x="328950" y="2325667"/>
+            <a:ext cx="2019048" cy="809524"/>
+          </a:xfrm>
+          <a:prstGeom prst="rect">
+            <a:avLst/>
+          </a:prstGeom>
+        </p:spPr>
+      </p:pic>
+      <p:sp>
+        <p:nvSpPr>
+          <p:cNvPr id="2" name="Rectangle 1"/>
+          <p:cNvSpPr>
+            <a:spLocks noChangeArrowheads="1"/>
+          </p:cNvSpPr>
+          <p:nvPr/>
+        </p:nvSpPr>
+        <p:spPr bwMode="auto">
+          <a:xfrm>
+            <a:off x="2398634" y="3315808"/>
+            <a:ext cx="1010836" cy="1003455"/>
+          </a:xfrm>
+          <a:prstGeom prst="rect">
+            <a:avLst/>
+          </a:prstGeom>
+          <a:noFill/>
+          <a:ln>
+            <a:noFill/>
+          </a:ln>
+          <a:effectLst/>
+          <a:extLst>
+            <a:ext uri="{909E8E84-426E-40DD-AFC4-6F175D3DCCD1}">
+              <a14:hiddenFill xmlns:a14="http://schemas.microsoft.com/office/drawing/2010/main">
+                <a:solidFill>
+                  <a:schemeClr val="accent1"/>
+                </a:solidFill>
+              </a14:hiddenFill>
+            </a:ext>
+            <a:ext uri="{91240B29-F687-4F45-9708-019B960494DF}">
+              <a14:hiddenLine xmlns:a14="http://schemas.microsoft.com/office/drawing/2010/main" w="9525">
+                <a:solidFill>
+                  <a:schemeClr val="tx1"/>
+                </a:solidFill>
+                <a:miter lim="800000"/>
+                <a:headEnd/>
+                <a:tailEnd/>
+              </a14:hiddenLine>
+            </a:ext>
+            <a:ext uri="{AF507438-7753-43E0-B8FC-AC1667EBCBE1}">
+              <a14:hiddenEffects xmlns:a14="http://schemas.microsoft.com/office/drawing/2010/main">
+                <a:effectLst>
+                  <a:outerShdw dist="35921" dir="2700000" algn="ctr" rotWithShape="0">
+                    <a:schemeClr val="bg2"/>
+                  </a:outerShdw>
+                </a:effectLst>
+              </a14:hiddenEffects>
+            </a:ext>
+          </a:extLst>
+        </p:spPr>
+        <p:txBody>
+          <a:bodyPr vert="horz" wrap="square" lIns="0" tIns="0" rIns="0" bIns="79350" numCol="1" anchor="ctr" anchorCtr="0" compatLnSpc="1">
+            <a:prstTxWarp prst="textNoShape">
+              <a:avLst/>
+            </a:prstTxWarp>
+            <a:spAutoFit/>
+          </a:bodyPr>
+          <a:lstStyle/>
+          <a:p>
+            <a:pPr marR="0" lvl="0" algn="l" defTabSz="914400" rtl="0" eaLnBrk="0" fontAlgn="base" latinLnBrk="0" hangingPunct="0">
+              <a:lnSpc>
+                <a:spcPct val="100000"/>
+              </a:lnSpc>
+              <a:spcBef>
+                <a:spcPct val="0"/>
+              </a:spcBef>
+              <a:spcAft>
+                <a:spcPct val="0"/>
+              </a:spcAft>
+              <a:buClrTx/>
+              <a:buSzTx/>
+              <a:tabLst/>
+            </a:pPr>
+            <a:r>
+              <a:rPr kumimoji="0" lang="en-US" altLang="en-US" sz="1200" b="1" i="0" u="none" strike="noStrike" cap="none" normalizeH="0" baseline="0" dirty="0" smtClean="0">
+                <a:ln>
+                  <a:noFill/>
+                </a:ln>
+                <a:solidFill>
+                  <a:srgbClr val="0C0D0E"/>
+                </a:solidFill>
+                <a:effectLst/>
+                <a:latin typeface="Arial Unicode MS"/>
+              </a:rPr>
+              <a:t>HEAD^2</a:t>
+            </a:r>
+          </a:p>
+          <a:p>
+            <a:pPr eaLnBrk="0" fontAlgn="base" hangingPunct="0">
+              <a:spcBef>
+                <a:spcPct val="0"/>
+              </a:spcBef>
+              <a:spcAft>
+                <a:spcPct val="0"/>
+              </a:spcAft>
+            </a:pPr>
+            <a:r>
+              <a:rPr lang="en-US" altLang="en-US" sz="1200" b="1" dirty="0" smtClean="0">
+                <a:solidFill>
+                  <a:srgbClr val="0C0D0E"/>
+                </a:solidFill>
+                <a:latin typeface="Arial Unicode MS"/>
+              </a:rPr>
+              <a:t>HEAD~2</a:t>
+            </a:r>
+            <a:endParaRPr kumimoji="0" lang="en-US" altLang="en-US" sz="1200" b="1" i="0" u="none" strike="noStrike" cap="none" normalizeH="0" baseline="0" dirty="0" smtClean="0">
+              <a:ln>
+                <a:noFill/>
+              </a:ln>
+              <a:solidFill>
+                <a:srgbClr val="9199A1"/>
+              </a:solidFill>
+              <a:effectLst/>
+            </a:endParaRPr>
+          </a:p>
+          <a:p>
+            <a:pPr marR="0" lvl="0" algn="l" defTabSz="914400" rtl="0" eaLnBrk="0" fontAlgn="base" latinLnBrk="0" hangingPunct="0">
+              <a:lnSpc>
+                <a:spcPct val="100000"/>
+              </a:lnSpc>
+              <a:spcBef>
+                <a:spcPct val="0"/>
+              </a:spcBef>
+              <a:spcAft>
+                <a:spcPct val="0"/>
+              </a:spcAft>
+              <a:buClrTx/>
+              <a:buSzTx/>
+              <a:tabLst/>
+            </a:pPr>
+            <a:r>
+              <a:rPr kumimoji="0" lang="en-US" altLang="en-US" sz="1200" b="1" i="0" u="none" strike="noStrike" cap="none" normalizeH="0" baseline="0" dirty="0" smtClean="0">
+                <a:ln>
+                  <a:noFill/>
+                </a:ln>
+                <a:solidFill>
+                  <a:srgbClr val="0C0D0E"/>
+                </a:solidFill>
+                <a:effectLst/>
+                <a:latin typeface="Arial Unicode MS"/>
+              </a:rPr>
+              <a:t>HEAD@{2}</a:t>
+            </a:r>
+            <a:endParaRPr kumimoji="0" lang="en-US" altLang="en-US" sz="1200" b="1" i="0" u="none" strike="noStrike" cap="none" normalizeH="0" baseline="0" dirty="0" smtClean="0">
+              <a:ln>
+                <a:noFill/>
+              </a:ln>
+              <a:solidFill>
+                <a:srgbClr val="9199A1"/>
+              </a:solidFill>
+              <a:effectLst/>
+            </a:endParaRPr>
+          </a:p>
+          <a:p>
+            <a:pPr marR="0" lvl="0" algn="l" defTabSz="914400" rtl="0" eaLnBrk="0" fontAlgn="base" latinLnBrk="0" hangingPunct="0">
+              <a:lnSpc>
+                <a:spcPct val="100000"/>
+              </a:lnSpc>
+              <a:spcBef>
+                <a:spcPct val="0"/>
+              </a:spcBef>
+              <a:spcAft>
+                <a:spcPct val="0"/>
+              </a:spcAft>
+              <a:buClrTx/>
+              <a:buSzTx/>
+              <a:tabLst/>
+            </a:pPr>
+            <a:r>
+              <a:rPr kumimoji="0" lang="en-US" altLang="en-US" sz="1200" b="1" i="0" u="none" strike="noStrike" cap="none" normalizeH="0" baseline="0" dirty="0" smtClean="0">
+                <a:ln>
+                  <a:noFill/>
+                </a:ln>
+                <a:solidFill>
+                  <a:srgbClr val="0C0D0E"/>
+                </a:solidFill>
+                <a:effectLst/>
+                <a:latin typeface="Arial Unicode MS"/>
+              </a:rPr>
+              <a:t>HEAD~~</a:t>
+            </a:r>
+            <a:endParaRPr kumimoji="0" lang="en-US" altLang="en-US" sz="1200" b="1" i="0" u="none" strike="noStrike" cap="none" normalizeH="0" baseline="0" dirty="0" smtClean="0">
+              <a:ln>
+                <a:noFill/>
+              </a:ln>
+              <a:solidFill>
+                <a:srgbClr val="9199A1"/>
+              </a:solidFill>
+              <a:effectLst/>
+            </a:endParaRPr>
+          </a:p>
+          <a:p>
+            <a:pPr marR="0" lvl="0" algn="l" defTabSz="914400" rtl="0" eaLnBrk="0" fontAlgn="base" latinLnBrk="0" hangingPunct="0">
+              <a:lnSpc>
+                <a:spcPct val="100000"/>
+              </a:lnSpc>
+              <a:spcBef>
+                <a:spcPct val="0"/>
+              </a:spcBef>
+              <a:spcAft>
+                <a:spcPct val="0"/>
+              </a:spcAft>
+              <a:buClrTx/>
+              <a:buSzTx/>
+              <a:tabLst/>
+            </a:pPr>
+            <a:r>
+              <a:rPr kumimoji="0" lang="en-US" altLang="en-US" sz="1200" b="1" i="0" u="none" strike="noStrike" cap="none" normalizeH="0" baseline="0" dirty="0" smtClean="0">
+                <a:ln>
+                  <a:noFill/>
+                </a:ln>
+                <a:solidFill>
+                  <a:srgbClr val="0C0D0E"/>
+                </a:solidFill>
+                <a:effectLst/>
+                <a:latin typeface="Arial Unicode MS"/>
+              </a:rPr>
+              <a:t>HEAD^^</a:t>
+            </a:r>
+            <a:endParaRPr kumimoji="0" lang="en-US" altLang="en-US" sz="1200" b="0" i="0" u="none" strike="noStrike" cap="none" normalizeH="0" baseline="0" dirty="0" smtClean="0">
+              <a:ln>
+                <a:noFill/>
+              </a:ln>
+              <a:solidFill>
+                <a:schemeClr val="tx1"/>
+              </a:solidFill>
+              <a:effectLst/>
+              <a:latin typeface="Arial" panose="020B0604020202020204" pitchFamily="34" charset="0"/>
+            </a:endParaRPr>
+          </a:p>
+        </p:txBody>
+      </p:sp>
+      <p:sp>
+        <p:nvSpPr>
+          <p:cNvPr id="10" name="Rectangle 9"/>
+          <p:cNvSpPr/>
+          <p:nvPr/>
+        </p:nvSpPr>
+        <p:spPr>
+          <a:xfrm>
+            <a:off x="328950" y="3454695"/>
+            <a:ext cx="1507944" cy="461665"/>
+          </a:xfrm>
+          <a:prstGeom prst="rect">
+            <a:avLst/>
+          </a:prstGeom>
+        </p:spPr>
+        <p:txBody>
+          <a:bodyPr wrap="square">
+            <a:spAutoFit/>
+          </a:bodyPr>
+          <a:lstStyle/>
+          <a:p>
+            <a:r>
+              <a:rPr lang="en-US" sz="1200" dirty="0" smtClean="0">
+                <a:solidFill>
+                  <a:srgbClr val="7030A0"/>
+                </a:solidFill>
+                <a:latin typeface="Arial" panose="020B0604020202020204" pitchFamily="34" charset="0"/>
+                <a:cs typeface="Arial" panose="020B0604020202020204" pitchFamily="34" charset="0"/>
+              </a:rPr>
+              <a:t>Other examples to pick the base</a:t>
+            </a:r>
+            <a:endParaRPr lang="en-US" sz="1200" dirty="0">
+              <a:solidFill>
+                <a:srgbClr val="7030A0"/>
+              </a:solidFill>
+            </a:endParaRPr>
+          </a:p>
+        </p:txBody>
+      </p:sp>
+      <p:cxnSp>
+        <p:nvCxnSpPr>
+          <p:cNvPr id="14" name="Straight Arrow Connector 13"/>
+          <p:cNvCxnSpPr>
+            <a:stCxn id="10" idx="3"/>
+          </p:cNvCxnSpPr>
+          <p:nvPr/>
+        </p:nvCxnSpPr>
+        <p:spPr>
+          <a:xfrm>
+            <a:off x="1836894" y="3685528"/>
+            <a:ext cx="430921" cy="38350"/>
+          </a:xfrm>
+          <a:prstGeom prst="straightConnector1">
+            <a:avLst/>
+          </a:prstGeom>
+          <a:ln w="34925">
+            <a:headEnd w="lg" len="lg"/>
+            <a:tailEnd type="triangle"/>
+          </a:ln>
+        </p:spPr>
+        <p:style>
+          <a:lnRef idx="3">
+            <a:schemeClr val="accent4"/>
+          </a:lnRef>
+          <a:fillRef idx="0">
+            <a:schemeClr val="accent4"/>
+          </a:fillRef>
+          <a:effectRef idx="2">
+            <a:schemeClr val="accent4"/>
+          </a:effectRef>
+          <a:fontRef idx="minor">
+            <a:schemeClr val="tx1"/>
+          </a:fontRef>
+        </p:style>
+      </p:cxnSp>
+    </p:spTree>
+    <p:extLst>
+      <p:ext uri="{BB962C8B-B14F-4D97-AF65-F5344CB8AC3E}">
+        <p14:creationId xmlns:p14="http://schemas.microsoft.com/office/powerpoint/2010/main" val="2350974787"/>
+      </p:ext>
+    </p:extLst>
+  </p:cSld>
+  <p:clrMapOvr>
+    <a:masterClrMapping/>
+  </p:clrMapOvr>
+</p:sld>
+</file>
+
+<file path=ppt/slides/slide9.xml><?xml version="1.0" encoding="utf-8"?>
+<p:sld xmlns:a="http://schemas.openxmlformats.org/drawingml/2006/main" xmlns:r="http://schemas.openxmlformats.org/officeDocument/2006/relationships" xmlns:p="http://schemas.openxmlformats.org/presentationml/2006/main">
+  <p:cSld>
+    <p:spTree>
+      <p:nvGrpSpPr>
+        <p:cNvPr id="1" name=""/>
+        <p:cNvGrpSpPr/>
+        <p:nvPr/>
+      </p:nvGrpSpPr>
+      <p:grpSpPr>
+        <a:xfrm>
+          <a:off x="0" y="0"/>
+          <a:ext cx="0" cy="0"/>
+          <a:chOff x="0" y="0"/>
+          <a:chExt cx="0" cy="0"/>
+        </a:xfrm>
+      </p:grpSpPr>
+      <p:sp>
+        <p:nvSpPr>
+          <p:cNvPr id="11" name="TextBox 10"/>
+          <p:cNvSpPr txBox="1"/>
+          <p:nvPr/>
+        </p:nvSpPr>
+        <p:spPr>
+          <a:xfrm>
+            <a:off x="485056" y="923950"/>
+            <a:ext cx="6256312" cy="1323439"/>
+          </a:xfrm>
+          <a:prstGeom prst="rect">
+            <a:avLst/>
+          </a:prstGeom>
+          <a:noFill/>
+        </p:spPr>
+        <p:txBody>
+          <a:bodyPr wrap="square" rtlCol="0">
+            <a:spAutoFit/>
+          </a:bodyPr>
+          <a:lstStyle/>
+          <a:p>
+            <a:r>
               <a:rPr lang="en-ID" sz="1600" dirty="0" smtClean="0"/>
-              <a:t>Clone you branch from Workshop I</a:t>
-            </a:r>
+              <a:t>Exercise 1</a:t>
+            </a:r>
+          </a:p>
+          <a:p>
+            <a:pPr marL="285750" indent="-285750">
+              <a:buFont typeface="Arial" panose="020B0604020202020204" pitchFamily="34" charset="0"/>
+              <a:buChar char="•"/>
+            </a:pPr>
+            <a:r>
+              <a:rPr lang="en-ID" sz="1600" dirty="0" smtClean="0"/>
+              <a:t>Clone </a:t>
+            </a:r>
+            <a:r>
+              <a:rPr lang="en-ID" sz="1600" dirty="0" smtClean="0"/>
+              <a:t>your </a:t>
+            </a:r>
+            <a:r>
+              <a:rPr lang="en-ID" sz="1600" dirty="0" smtClean="0"/>
+              <a:t>branch from Workshop </a:t>
+            </a:r>
+            <a:r>
+              <a:rPr lang="en-ID" sz="1600" dirty="0" smtClean="0"/>
+              <a:t>I </a:t>
+            </a:r>
+            <a:r>
+              <a:rPr lang="en-ID" sz="900" dirty="0" smtClean="0"/>
+              <a:t>(remember the command to clone a specific command)</a:t>
+            </a:r>
+            <a:endParaRPr lang="en-ID" sz="900" dirty="0" smtClean="0"/>
+          </a:p>
+          <a:p>
+            <a:pPr marL="285750" indent="-285750">
+              <a:buFont typeface="Arial" panose="020B0604020202020204" pitchFamily="34" charset="0"/>
+              <a:buChar char="•"/>
+            </a:pPr>
+            <a:r>
+              <a:rPr lang="en-ID" sz="1600" dirty="0" smtClean="0"/>
+              <a:t>Edit something and create multiple </a:t>
+            </a:r>
+            <a:r>
+              <a:rPr lang="en-ID" sz="1600" dirty="0" smtClean="0"/>
+              <a:t>commit points</a:t>
+            </a:r>
+            <a:endParaRPr lang="en-ID" sz="1600" dirty="0" smtClean="0"/>
+          </a:p>
+          <a:p>
+            <a:pPr marL="285750" indent="-285750">
+              <a:buFont typeface="Arial" panose="020B0604020202020204" pitchFamily="34" charset="0"/>
+              <a:buChar char="•"/>
+            </a:pPr>
+            <a:r>
+              <a:rPr lang="en-ID" sz="1600" i="1" dirty="0"/>
+              <a:t>S</a:t>
+            </a:r>
+            <a:r>
+              <a:rPr lang="en-ID" sz="1600" i="1" dirty="0" smtClean="0"/>
+              <a:t>quash some </a:t>
+            </a:r>
+            <a:r>
+              <a:rPr lang="en-ID" sz="1600" i="1" dirty="0" smtClean="0"/>
+              <a:t>commit points </a:t>
+            </a:r>
+            <a:r>
+              <a:rPr lang="en-ID" sz="1600" i="1" dirty="0" smtClean="0"/>
+              <a:t>together</a:t>
+            </a:r>
+          </a:p>
+          <a:p>
+            <a:pPr marL="285750" indent="-285750">
+              <a:buFont typeface="Arial" panose="020B0604020202020204" pitchFamily="34" charset="0"/>
+              <a:buChar char="•"/>
+            </a:pPr>
+            <a:r>
+              <a:rPr lang="en-ID" sz="1600" dirty="0" smtClean="0"/>
+              <a:t>Publish your branch again</a:t>
+            </a:r>
+          </a:p>
+        </p:txBody>
+      </p:sp>
+      <p:sp>
+        <p:nvSpPr>
+          <p:cNvPr id="6" name="TextBox 5"/>
+          <p:cNvSpPr txBox="1"/>
+          <p:nvPr/>
+        </p:nvSpPr>
+        <p:spPr>
+          <a:xfrm>
+            <a:off x="332656" y="195486"/>
+            <a:ext cx="6192688" cy="369332"/>
+          </a:xfrm>
+          <a:prstGeom prst="rect">
+            <a:avLst/>
+          </a:prstGeom>
+          <a:noFill/>
+        </p:spPr>
+        <p:txBody>
+          <a:bodyPr wrap="square" rtlCol="0">
+            <a:spAutoFit/>
+          </a:bodyPr>
+          <a:lstStyle/>
+          <a:p>
+            <a:r>
+              <a:rPr lang="en-ID" b="1" dirty="0" smtClean="0">
+                <a:solidFill>
+                  <a:srgbClr val="392900"/>
+                </a:solidFill>
+                <a:latin typeface="Bookman Old Style" panose="02050604050505020204" pitchFamily="18" charset="0"/>
+              </a:rPr>
+              <a:t>CDC – git interactive rebase / Practice</a:t>
+            </a:r>
+            <a:endParaRPr lang="en-US" b="1" dirty="0">
+              <a:solidFill>
+                <a:srgbClr val="392900"/>
+              </a:solidFill>
+              <a:latin typeface="Bookman Old Style" panose="02050604050505020204" pitchFamily="18" charset="0"/>
+            </a:endParaRPr>
+          </a:p>
+        </p:txBody>
+      </p:sp>
+      <p:sp>
+        <p:nvSpPr>
+          <p:cNvPr id="7" name="TextBox 6"/>
+          <p:cNvSpPr txBox="1"/>
+          <p:nvPr/>
+        </p:nvSpPr>
+        <p:spPr>
+          <a:xfrm>
+            <a:off x="485056" y="2634137"/>
+            <a:ext cx="5680248" cy="1323439"/>
+          </a:xfrm>
+          <a:prstGeom prst="rect">
+            <a:avLst/>
+          </a:prstGeom>
+          <a:noFill/>
+        </p:spPr>
+        <p:txBody>
+          <a:bodyPr wrap="square" rtlCol="0">
+            <a:spAutoFit/>
+          </a:bodyPr>
+          <a:lstStyle/>
+          <a:p>
+            <a:r>
+              <a:rPr lang="en-ID" sz="1600" dirty="0" smtClean="0"/>
+              <a:t>Exercise 2</a:t>
+            </a:r>
+          </a:p>
+          <a:p>
+            <a:pPr marL="285750" indent="-285750">
+              <a:buFont typeface="Arial" panose="020B0604020202020204" pitchFamily="34" charset="0"/>
+              <a:buChar char="•"/>
+            </a:pPr>
+            <a:r>
+              <a:rPr lang="en-ID" sz="1600" dirty="0" smtClean="0"/>
+              <a:t>Clone </a:t>
+            </a:r>
+            <a:r>
+              <a:rPr lang="en-ID" sz="1600" dirty="0" smtClean="0"/>
+              <a:t>your </a:t>
+            </a:r>
+            <a:r>
+              <a:rPr lang="en-ID" sz="1600" dirty="0" smtClean="0"/>
+              <a:t>branch from Workshop </a:t>
+            </a:r>
+            <a:r>
+              <a:rPr lang="en-ID" sz="1600" dirty="0" smtClean="0"/>
+              <a:t>I </a:t>
+            </a:r>
+            <a:endParaRPr lang="en-ID" sz="1600" dirty="0" smtClean="0"/>
           </a:p>
           <a:p>
             <a:pPr marL="285750" indent="-285750">
@@ -5458,6 +7195,21 @@
 </file>
 
 <file path=customXml/item1.xml><?xml version="1.0" encoding="utf-8"?>
+<p:properties xmlns:p="http://schemas.microsoft.com/office/2006/metadata/properties" xmlns:xsi="http://www.w3.org/2001/XMLSchema-instance" xmlns:pc="http://schemas.microsoft.com/office/infopath/2007/PartnerControls">
+  <documentManagement/>
+</p:properties>
+</file>
+
+<file path=customXml/item2.xml><?xml version="1.0" encoding="utf-8"?>
+<?mso-contentType ?>
+<FormTemplates xmlns="http://schemas.microsoft.com/sharepoint/v3/contenttype/forms">
+  <Display>DocumentLibraryForm</Display>
+  <Edit>DocumentLibraryForm</Edit>
+  <New>DocumentLibraryForm</New>
+</FormTemplates>
+</file>
+
+<file path=customXml/item3.xml><?xml version="1.0" encoding="utf-8"?>
 <ct:contentTypeSchema xmlns:ct="http://schemas.microsoft.com/office/2006/metadata/contentType" xmlns:ma="http://schemas.microsoft.com/office/2006/metadata/properties/metaAttributes" ct:_="" ma:_="" ma:contentTypeName="Document" ma:contentTypeID="0x0101003684E481DE84C9499EF0F81972D7EF96" ma:contentTypeVersion="0" ma:contentTypeDescription="Create a new document." ma:contentTypeScope="" ma:versionID="1082b6f87e9a9efb3f4dd16ca55e9303">
   <xsd:schema xmlns:xsd="http://www.w3.org/2001/XMLSchema" xmlns:xs="http://www.w3.org/2001/XMLSchema" xmlns:p="http://schemas.microsoft.com/office/2006/metadata/properties" targetNamespace="http://schemas.microsoft.com/office/2006/metadata/properties" ma:root="true" ma:fieldsID="1b05d82d297216baf5b26c55225140df">
     <xsd:element name="properties">
@@ -5571,38 +7323,7 @@
 </ct:contentTypeSchema>
 </file>
 
-<file path=customXml/item2.xml><?xml version="1.0" encoding="utf-8"?>
-<p:properties xmlns:p="http://schemas.microsoft.com/office/2006/metadata/properties" xmlns:xsi="http://www.w3.org/2001/XMLSchema-instance" xmlns:pc="http://schemas.microsoft.com/office/infopath/2007/PartnerControls">
-  <documentManagement/>
-</p:properties>
-</file>
-
-<file path=customXml/item3.xml><?xml version="1.0" encoding="utf-8"?>
-<?mso-contentType ?>
-<FormTemplates xmlns="http://schemas.microsoft.com/sharepoint/v3/contenttype/forms">
-  <Display>DocumentLibraryForm</Display>
-  <Edit>DocumentLibraryForm</Edit>
-  <New>DocumentLibraryForm</New>
-</FormTemplates>
-</file>
-
 <file path=customXml/itemProps1.xml><?xml version="1.0" encoding="utf-8"?>
-<ds:datastoreItem xmlns:ds="http://schemas.openxmlformats.org/officeDocument/2006/customXml" ds:itemID="{6B82694F-752F-4827-A348-4AA5A968F420}">
-  <ds:schemaRefs>
-    <ds:schemaRef ds:uri="http://schemas.microsoft.com/office/2006/metadata/contentType"/>
-    <ds:schemaRef ds:uri="http://schemas.microsoft.com/office/2006/metadata/properties/metaAttributes"/>
-    <ds:schemaRef ds:uri="http://www.w3.org/2001/XMLSchema"/>
-    <ds:schemaRef ds:uri="http://schemas.microsoft.com/office/2006/metadata/properties"/>
-    <ds:schemaRef ds:uri="http://schemas.openxmlformats.org/package/2006/metadata/core-properties"/>
-    <ds:schemaRef ds:uri="http://purl.org/dc/elements/1.1/"/>
-    <ds:schemaRef ds:uri="http://purl.org/dc/terms/"/>
-    <ds:schemaRef ds:uri="http://schemas.microsoft.com/internal/obd"/>
-    <ds:schemaRef ds:uri="http://schemas.microsoft.com/office/infopath/2007/PartnerControls"/>
-  </ds:schemaRefs>
-</ds:datastoreItem>
-</file>
-
-<file path=customXml/itemProps2.xml><?xml version="1.0" encoding="utf-8"?>
 <ds:datastoreItem xmlns:ds="http://schemas.openxmlformats.org/officeDocument/2006/customXml" ds:itemID="{12B43294-76B4-4246-849F-628E6870A5FD}">
   <ds:schemaRefs>
     <ds:schemaRef ds:uri="http://schemas.microsoft.com/office/2006/metadata/properties"/>
@@ -5617,10 +7338,26 @@
 </ds:datastoreItem>
 </file>
 
-<file path=customXml/itemProps3.xml><?xml version="1.0" encoding="utf-8"?>
+<file path=customXml/itemProps2.xml><?xml version="1.0" encoding="utf-8"?>
 <ds:datastoreItem xmlns:ds="http://schemas.openxmlformats.org/officeDocument/2006/customXml" ds:itemID="{DB5E681D-860B-4D22-80CF-C7472F8C312F}">
   <ds:schemaRefs>
     <ds:schemaRef ds:uri="http://schemas.microsoft.com/sharepoint/v3/contenttype/forms"/>
   </ds:schemaRefs>
 </ds:datastoreItem>
+</file>
+
+<file path=customXml/itemProps3.xml><?xml version="1.0" encoding="utf-8"?>
+<ds:datastoreItem xmlns:ds="http://schemas.openxmlformats.org/officeDocument/2006/customXml" ds:itemID="{6B82694F-752F-4827-A348-4AA5A968F420}">
+  <ds:schemaRefs>
+    <ds:schemaRef ds:uri="http://schemas.microsoft.com/office/2006/metadata/contentType"/>
+    <ds:schemaRef ds:uri="http://schemas.microsoft.com/office/2006/metadata/properties/metaAttributes"/>
+    <ds:schemaRef ds:uri="http://www.w3.org/2001/XMLSchema"/>
+    <ds:schemaRef ds:uri="http://schemas.microsoft.com/office/2006/metadata/properties"/>
+    <ds:schemaRef ds:uri="http://schemas.openxmlformats.org/package/2006/metadata/core-properties"/>
+    <ds:schemaRef ds:uri="http://purl.org/dc/elements/1.1/"/>
+    <ds:schemaRef ds:uri="http://purl.org/dc/terms/"/>
+    <ds:schemaRef ds:uri="http://schemas.microsoft.com/internal/obd"/>
+    <ds:schemaRef ds:uri="http://schemas.microsoft.com/office/infopath/2007/PartnerControls"/>
+  </ds:schemaRefs>
+</ds:datastoreItem>
 </file>
</xml_diff>

<commit_message>
latest changed (slide order for explaining HEAD) after TTT
</commit_message>
<xml_diff>
--- a/cdc_git_ws2.pptx
+++ b/cdc_git_ws2.pptx
@@ -15,8 +15,8 @@
     <p:sldId id="296" r:id="rId9"/>
     <p:sldId id="305" r:id="rId10"/>
     <p:sldId id="311" r:id="rId11"/>
-    <p:sldId id="312" r:id="rId12"/>
-    <p:sldId id="309" r:id="rId13"/>
+    <p:sldId id="309" r:id="rId12"/>
+    <p:sldId id="312" r:id="rId13"/>
   </p:sldIdLst>
   <p:sldSz cx="6858000" cy="5143500"/>
   <p:notesSz cx="6858000" cy="9144000"/>
@@ -1274,34 +1274,6 @@
           <a:bodyPr/>
           <a:lstStyle/>
           <a:p>
-            <a:r>
-              <a:rPr lang="en-ID" dirty="0" smtClean="0"/>
-              <a:t>~2 means </a:t>
-            </a:r>
-            <a:r>
-              <a:rPr lang="en-ID" b="1" dirty="0" smtClean="0"/>
-              <a:t>up two levels in the hierarchy</a:t>
-            </a:r>
-            <a:r>
-              <a:rPr lang="en-ID" dirty="0" smtClean="0"/>
-              <a:t>, via the first parent if a commit has more than one parent</a:t>
-            </a:r>
-          </a:p>
-          <a:p>
-            <a:r>
-              <a:rPr lang="en-ID" dirty="0" smtClean="0"/>
-              <a:t>^2 means </a:t>
-            </a:r>
-            <a:r>
-              <a:rPr lang="en-ID" b="1" dirty="0" smtClean="0"/>
-              <a:t>the second parent</a:t>
-            </a:r>
-            <a:r>
-              <a:rPr lang="en-ID" dirty="0" smtClean="0"/>
-              <a:t> where a commit has more than one parent (i.e. because it's a merge)</a:t>
-            </a:r>
-          </a:p>
-          <a:p>
             <a:endParaRPr lang="en-US" dirty="0"/>
           </a:p>
         </p:txBody>
@@ -1332,7 +1304,7 @@
     </p:spTree>
     <p:extLst>
       <p:ext uri="{BB962C8B-B14F-4D97-AF65-F5344CB8AC3E}">
-        <p14:creationId xmlns:p14="http://schemas.microsoft.com/office/powerpoint/2010/main" val="2642856106"/>
+        <p14:creationId xmlns:p14="http://schemas.microsoft.com/office/powerpoint/2010/main" val="647520961"/>
       </p:ext>
     </p:extLst>
   </p:cSld>
@@ -1386,6 +1358,38 @@
           <a:bodyPr/>
           <a:lstStyle/>
           <a:p>
+            <a:r>
+              <a:rPr lang="en-ID" dirty="0" smtClean="0"/>
+              <a:t>~2 </a:t>
+            </a:r>
+            <a:r>
+              <a:rPr lang="en-ID" dirty="0" smtClean="0"/>
+              <a:t>means </a:t>
+            </a:r>
+            <a:r>
+              <a:rPr lang="en-ID" b="1" dirty="0" smtClean="0"/>
+              <a:t>up two levels in the hierarchy</a:t>
+            </a:r>
+            <a:r>
+              <a:rPr lang="en-ID" dirty="0" smtClean="0"/>
+              <a:t>, via the first parent if a commit has more than one parent</a:t>
+            </a:r>
+          </a:p>
+          <a:p>
+            <a:r>
+              <a:rPr lang="en-ID" dirty="0" smtClean="0"/>
+              <a:t>^2 means </a:t>
+            </a:r>
+            <a:r>
+              <a:rPr lang="en-ID" b="1" dirty="0" smtClean="0"/>
+              <a:t>the second parent</a:t>
+            </a:r>
+            <a:r>
+              <a:rPr lang="en-ID" dirty="0" smtClean="0"/>
+              <a:t> where a commit has more than one parent (i.e. because it's a merge)</a:t>
+            </a:r>
+          </a:p>
+          <a:p>
             <a:endParaRPr lang="en-US" dirty="0"/>
           </a:p>
         </p:txBody>
@@ -1416,7 +1420,7 @@
     </p:spTree>
     <p:extLst>
       <p:ext uri="{BB962C8B-B14F-4D97-AF65-F5344CB8AC3E}">
-        <p14:creationId xmlns:p14="http://schemas.microsoft.com/office/powerpoint/2010/main" val="647520961"/>
+        <p14:creationId xmlns:p14="http://schemas.microsoft.com/office/powerpoint/2010/main" val="2642856106"/>
       </p:ext>
     </p:extLst>
   </p:cSld>
@@ -4610,15 +4614,11 @@
           <a:p>
             <a:r>
               <a:rPr lang="en-ID" dirty="0" smtClean="0"/>
-              <a:t>As SE/SQ, you think some commits could be logically squashed/</a:t>
-            </a:r>
-            <a:r>
-              <a:rPr lang="en-ID" dirty="0" err="1" smtClean="0"/>
-              <a:t>splitted</a:t>
+              <a:t>As SE/SQ, you think some commits could be logically </a:t>
             </a:r>
             <a:r>
               <a:rPr lang="en-ID" dirty="0" smtClean="0"/>
-              <a:t>!</a:t>
+              <a:t>squashed!</a:t>
             </a:r>
             <a:endParaRPr lang="en-US" dirty="0"/>
           </a:p>
@@ -4895,7 +4895,14 @@
                 <a:latin typeface="Courier New" panose="02070309020205020404" pitchFamily="49" charset="0"/>
                 <a:cs typeface="Courier New" panose="02070309020205020404" pitchFamily="49" charset="0"/>
               </a:rPr>
-              <a:t>git rebase –i </a:t>
+              <a:t>git rebase </a:t>
+            </a:r>
+            <a:r>
+              <a:rPr lang="en-ID" sz="1200" dirty="0" smtClean="0">
+                <a:latin typeface="Courier New" panose="02070309020205020404" pitchFamily="49" charset="0"/>
+                <a:cs typeface="Courier New" panose="02070309020205020404" pitchFamily="49" charset="0"/>
+              </a:rPr>
+              <a:t>-i </a:t>
             </a:r>
             <a:r>
               <a:rPr lang="en-US" sz="1200" dirty="0"/>
@@ -4913,7 +4920,7 @@
         <p:spPr>
           <a:xfrm>
             <a:off x="3425917" y="1125495"/>
-            <a:ext cx="2955411" cy="276999"/>
+            <a:ext cx="3171435" cy="276999"/>
           </a:xfrm>
           <a:prstGeom prst="rect">
             <a:avLst/>
@@ -4951,7 +4958,14 @@
                 <a:latin typeface="Courier New" panose="02070309020205020404" pitchFamily="49" charset="0"/>
                 <a:cs typeface="Courier New" panose="02070309020205020404" pitchFamily="49" charset="0"/>
               </a:rPr>
-              <a:t>git rebase –interactive </a:t>
+              <a:t>git rebase </a:t>
+            </a:r>
+            <a:r>
+              <a:rPr lang="en-ID" sz="1200" dirty="0" smtClean="0">
+                <a:latin typeface="Courier New" panose="02070309020205020404" pitchFamily="49" charset="0"/>
+                <a:cs typeface="Courier New" panose="02070309020205020404" pitchFamily="49" charset="0"/>
+              </a:rPr>
+              <a:t>--interactive </a:t>
             </a:r>
             <a:r>
               <a:rPr lang="en-US" sz="1200" dirty="0"/>
@@ -5436,29 +5450,68 @@
           <a:lstStyle/>
           <a:p>
             <a:r>
+              <a:rPr lang="en-ID" sz="1200" dirty="0" smtClean="0">
+                <a:latin typeface="Arial" panose="020B0604020202020204" pitchFamily="34" charset="0"/>
+                <a:cs typeface="Arial" panose="020B0604020202020204" pitchFamily="34" charset="0"/>
+              </a:rPr>
+              <a:t>pick </a:t>
+            </a:r>
+            <a:r>
               <a:rPr lang="en-ID" sz="1200" dirty="0">
                 <a:latin typeface="Arial" panose="020B0604020202020204" pitchFamily="34" charset="0"/>
                 <a:cs typeface="Arial" panose="020B0604020202020204" pitchFamily="34" charset="0"/>
               </a:rPr>
-              <a:t>pick 9629e9b Add capybaras to index.</a:t>
-            </a:r>
-          </a:p>
-          <a:p>
+              <a:t>9629e9b Add capybaras to index.</a:t>
+            </a:r>
+          </a:p>
+          <a:p>
+            <a:r>
+              <a:rPr lang="en-ID" sz="1200" dirty="0" smtClean="0">
+                <a:latin typeface="Arial" panose="020B0604020202020204" pitchFamily="34" charset="0"/>
+                <a:cs typeface="Arial" panose="020B0604020202020204" pitchFamily="34" charset="0"/>
+              </a:rPr>
+              <a:t>pick</a:t>
+            </a:r>
+            <a:r>
+              <a:rPr lang="pt-BR" sz="1200" dirty="0" smtClean="0">
+                <a:latin typeface="Arial" panose="020B0604020202020204" pitchFamily="34" charset="0"/>
+                <a:cs typeface="Arial" panose="020B0604020202020204" pitchFamily="34" charset="0"/>
+              </a:rPr>
+              <a:t> </a:t>
+            </a:r>
             <a:r>
               <a:rPr lang="pt-BR" sz="1200" dirty="0">
                 <a:latin typeface="Arial" panose="020B0604020202020204" pitchFamily="34" charset="0"/>
                 <a:cs typeface="Arial" panose="020B0604020202020204" pitchFamily="34" charset="0"/>
               </a:rPr>
-              <a:t>pick 21e37b1 Add capybaras page.</a:t>
-            </a:r>
-          </a:p>
-          <a:p>
+              <a:t>21e37b1 </a:t>
+            </a:r>
+            <a:r>
+              <a:rPr lang="pt-BR" sz="1200" dirty="0" smtClean="0">
+                <a:latin typeface="Arial" panose="020B0604020202020204" pitchFamily="34" charset="0"/>
+                <a:cs typeface="Arial" panose="020B0604020202020204" pitchFamily="34" charset="0"/>
+              </a:rPr>
+              <a:t>New message.</a:t>
+            </a:r>
+            <a:endParaRPr lang="pt-BR" sz="1200" dirty="0">
+              <a:latin typeface="Arial" panose="020B0604020202020204" pitchFamily="34" charset="0"/>
+              <a:cs typeface="Arial" panose="020B0604020202020204" pitchFamily="34" charset="0"/>
+            </a:endParaRPr>
+          </a:p>
+          <a:p>
+            <a:r>
+              <a:rPr lang="en-ID" sz="1200" dirty="0" smtClean="0">
+                <a:latin typeface="Arial" panose="020B0604020202020204" pitchFamily="34" charset="0"/>
+                <a:cs typeface="Arial" panose="020B0604020202020204" pitchFamily="34" charset="0"/>
+              </a:rPr>
+              <a:t>pick </a:t>
+            </a:r>
             <a:r>
               <a:rPr lang="en-ID" sz="1200" dirty="0">
                 <a:latin typeface="Arial" panose="020B0604020202020204" pitchFamily="34" charset="0"/>
                 <a:cs typeface="Arial" panose="020B0604020202020204" pitchFamily="34" charset="0"/>
               </a:rPr>
-              <a:t>pick eb7d5a0 Actually, the plural is 'capybara'.</a:t>
+              <a:t>eb7d5a0 Actually, the plural is 'capybara'.</a:t>
             </a:r>
           </a:p>
           <a:p>
@@ -5836,6 +5889,234 @@
 </file>
 
 <file path=ppt/slides/slide8.xml><?xml version="1.0" encoding="utf-8"?>
+<p:sld xmlns:a="http://schemas.openxmlformats.org/drawingml/2006/main" xmlns:r="http://schemas.openxmlformats.org/officeDocument/2006/relationships" xmlns:p="http://schemas.openxmlformats.org/presentationml/2006/main">
+  <p:cSld>
+    <p:spTree>
+      <p:nvGrpSpPr>
+        <p:cNvPr id="1" name=""/>
+        <p:cNvGrpSpPr/>
+        <p:nvPr/>
+      </p:nvGrpSpPr>
+      <p:grpSpPr>
+        <a:xfrm>
+          <a:off x="0" y="0"/>
+          <a:ext cx="0" cy="0"/>
+          <a:chOff x="0" y="0"/>
+          <a:chExt cx="0" cy="0"/>
+        </a:xfrm>
+      </p:grpSpPr>
+      <p:sp>
+        <p:nvSpPr>
+          <p:cNvPr id="11" name="TextBox 10"/>
+          <p:cNvSpPr txBox="1"/>
+          <p:nvPr/>
+        </p:nvSpPr>
+        <p:spPr>
+          <a:xfrm>
+            <a:off x="485056" y="923950"/>
+            <a:ext cx="6256312" cy="1323439"/>
+          </a:xfrm>
+          <a:prstGeom prst="rect">
+            <a:avLst/>
+          </a:prstGeom>
+          <a:noFill/>
+        </p:spPr>
+        <p:txBody>
+          <a:bodyPr wrap="square" rtlCol="0">
+            <a:spAutoFit/>
+          </a:bodyPr>
+          <a:lstStyle/>
+          <a:p>
+            <a:r>
+              <a:rPr lang="en-ID" sz="1600" dirty="0" smtClean="0"/>
+              <a:t>Exercise 1</a:t>
+            </a:r>
+          </a:p>
+          <a:p>
+            <a:pPr marL="285750" indent="-285750">
+              <a:buFont typeface="Arial" panose="020B0604020202020204" pitchFamily="34" charset="0"/>
+              <a:buChar char="•"/>
+            </a:pPr>
+            <a:r>
+              <a:rPr lang="en-ID" sz="1600" dirty="0" smtClean="0"/>
+              <a:t>Clone your branch from Workshop I </a:t>
+            </a:r>
+            <a:r>
+              <a:rPr lang="en-ID" sz="900" dirty="0" smtClean="0"/>
+              <a:t>(remember the command to clone a specific </a:t>
+            </a:r>
+            <a:r>
+              <a:rPr lang="en-ID" sz="900" dirty="0" smtClean="0"/>
+              <a:t>branch)</a:t>
+            </a:r>
+            <a:endParaRPr lang="en-ID" sz="900" dirty="0" smtClean="0"/>
+          </a:p>
+          <a:p>
+            <a:pPr marL="285750" indent="-285750">
+              <a:buFont typeface="Arial" panose="020B0604020202020204" pitchFamily="34" charset="0"/>
+              <a:buChar char="•"/>
+            </a:pPr>
+            <a:r>
+              <a:rPr lang="en-ID" sz="1600" dirty="0" smtClean="0"/>
+              <a:t>Edit something and create multiple commit points</a:t>
+            </a:r>
+          </a:p>
+          <a:p>
+            <a:pPr marL="285750" indent="-285750">
+              <a:buFont typeface="Arial" panose="020B0604020202020204" pitchFamily="34" charset="0"/>
+              <a:buChar char="•"/>
+            </a:pPr>
+            <a:r>
+              <a:rPr lang="en-ID" sz="1600" i="1" dirty="0"/>
+              <a:t>S</a:t>
+            </a:r>
+            <a:r>
+              <a:rPr lang="en-ID" sz="1600" i="1" dirty="0" smtClean="0"/>
+              <a:t>quash some commit points together</a:t>
+            </a:r>
+          </a:p>
+          <a:p>
+            <a:pPr marL="285750" indent="-285750">
+              <a:buFont typeface="Arial" panose="020B0604020202020204" pitchFamily="34" charset="0"/>
+              <a:buChar char="•"/>
+            </a:pPr>
+            <a:r>
+              <a:rPr lang="en-ID" sz="1600" dirty="0" smtClean="0"/>
+              <a:t>Publish your branch again</a:t>
+            </a:r>
+          </a:p>
+        </p:txBody>
+      </p:sp>
+      <p:sp>
+        <p:nvSpPr>
+          <p:cNvPr id="6" name="TextBox 5"/>
+          <p:cNvSpPr txBox="1"/>
+          <p:nvPr/>
+        </p:nvSpPr>
+        <p:spPr>
+          <a:xfrm>
+            <a:off x="332656" y="195486"/>
+            <a:ext cx="6192688" cy="369332"/>
+          </a:xfrm>
+          <a:prstGeom prst="rect">
+            <a:avLst/>
+          </a:prstGeom>
+          <a:noFill/>
+        </p:spPr>
+        <p:txBody>
+          <a:bodyPr wrap="square" rtlCol="0">
+            <a:spAutoFit/>
+          </a:bodyPr>
+          <a:lstStyle/>
+          <a:p>
+            <a:r>
+              <a:rPr lang="en-ID" b="1" dirty="0" smtClean="0">
+                <a:solidFill>
+                  <a:srgbClr val="392900"/>
+                </a:solidFill>
+                <a:latin typeface="Bookman Old Style" panose="02050604050505020204" pitchFamily="18" charset="0"/>
+              </a:rPr>
+              <a:t>CDC – git interactive rebase / Practice</a:t>
+            </a:r>
+            <a:endParaRPr lang="en-US" b="1" dirty="0">
+              <a:solidFill>
+                <a:srgbClr val="392900"/>
+              </a:solidFill>
+              <a:latin typeface="Bookman Old Style" panose="02050604050505020204" pitchFamily="18" charset="0"/>
+            </a:endParaRPr>
+          </a:p>
+        </p:txBody>
+      </p:sp>
+      <p:sp>
+        <p:nvSpPr>
+          <p:cNvPr id="7" name="TextBox 6"/>
+          <p:cNvSpPr txBox="1"/>
+          <p:nvPr/>
+        </p:nvSpPr>
+        <p:spPr>
+          <a:xfrm>
+            <a:off x="485056" y="2634137"/>
+            <a:ext cx="5680248" cy="1323439"/>
+          </a:xfrm>
+          <a:prstGeom prst="rect">
+            <a:avLst/>
+          </a:prstGeom>
+          <a:noFill/>
+        </p:spPr>
+        <p:txBody>
+          <a:bodyPr wrap="square" rtlCol="0">
+            <a:spAutoFit/>
+          </a:bodyPr>
+          <a:lstStyle/>
+          <a:p>
+            <a:r>
+              <a:rPr lang="en-ID" sz="1600" dirty="0" smtClean="0"/>
+              <a:t>Exercise 2</a:t>
+            </a:r>
+          </a:p>
+          <a:p>
+            <a:pPr marL="285750" indent="-285750">
+              <a:buFont typeface="Arial" panose="020B0604020202020204" pitchFamily="34" charset="0"/>
+              <a:buChar char="•"/>
+            </a:pPr>
+            <a:r>
+              <a:rPr lang="en-ID" sz="1600" dirty="0" smtClean="0"/>
+              <a:t>Clone your branch from Workshop I </a:t>
+            </a:r>
+          </a:p>
+          <a:p>
+            <a:pPr marL="285750" indent="-285750">
+              <a:buFont typeface="Arial" panose="020B0604020202020204" pitchFamily="34" charset="0"/>
+              <a:buChar char="•"/>
+            </a:pPr>
+            <a:r>
+              <a:rPr lang="en-ID" sz="1600" dirty="0" smtClean="0"/>
+              <a:t>Edit something and create multiple commits</a:t>
+            </a:r>
+          </a:p>
+          <a:p>
+            <a:pPr marL="285750" indent="-285750">
+              <a:buFont typeface="Arial" panose="020B0604020202020204" pitchFamily="34" charset="0"/>
+              <a:buChar char="•"/>
+            </a:pPr>
+            <a:r>
+              <a:rPr lang="en-ID" sz="1600" i="1" dirty="0" smtClean="0"/>
+              <a:t>Change the commit messages, be more specific</a:t>
+            </a:r>
+          </a:p>
+          <a:p>
+            <a:pPr marL="285750" indent="-285750">
+              <a:buFont typeface="Arial" panose="020B0604020202020204" pitchFamily="34" charset="0"/>
+              <a:buChar char="•"/>
+            </a:pPr>
+            <a:r>
+              <a:rPr lang="en-ID" sz="1600" dirty="0" smtClean="0"/>
+              <a:t>Publish your branch again</a:t>
+            </a:r>
+          </a:p>
+        </p:txBody>
+      </p:sp>
+    </p:spTree>
+    <p:extLst>
+      <p:ext uri="{BB962C8B-B14F-4D97-AF65-F5344CB8AC3E}">
+        <p14:creationId xmlns:p14="http://schemas.microsoft.com/office/powerpoint/2010/main" val="3693267280"/>
+      </p:ext>
+    </p:extLst>
+  </p:cSld>
+  <p:clrMapOvr>
+    <a:masterClrMapping/>
+  </p:clrMapOvr>
+  <p:timing>
+    <p:tnLst>
+      <p:par>
+        <p:cTn id="1" dur="indefinite" restart="never" nodeType="tmRoot"/>
+      </p:par>
+    </p:tnLst>
+  </p:timing>
+</p:sld>
+</file>
+
+<file path=ppt/slides/slide9.xml><?xml version="1.0" encoding="utf-8"?>
 <p:sld xmlns:a="http://schemas.openxmlformats.org/drawingml/2006/main" xmlns:r="http://schemas.openxmlformats.org/officeDocument/2006/relationships" xmlns:p="http://schemas.openxmlformats.org/presentationml/2006/main">
   <p:cSld>
     <p:spTree>
@@ -6259,7 +6540,20 @@
                 <a:effectLst/>
                 <a:latin typeface="Arial Unicode MS"/>
               </a:rPr>
-              <a:t>HEAD~~</a:t>
+              <a:t>HEAD</a:t>
+            </a:r>
+            <a:r>
+              <a:rPr kumimoji="0" lang="en-US" altLang="en-US" sz="1200" b="1" i="0" u="none" strike="noStrike" cap="none" normalizeH="0" baseline="0" dirty="0" smtClean="0">
+                <a:ln>
+                  <a:noFill/>
+                </a:ln>
+                <a:solidFill>
+                  <a:srgbClr val="0C0D0E"/>
+                </a:solidFill>
+                <a:effectLst/>
+                <a:latin typeface="Arial Unicode MS"/>
+              </a:rPr>
+              <a:t>~~</a:t>
             </a:r>
             <a:endParaRPr kumimoji="0" lang="en-US" altLang="en-US" sz="1200" b="1" i="0" u="none" strike="noStrike" cap="none" normalizeH="0" baseline="0" dirty="0" smtClean="0">
               <a:ln>
@@ -6397,268 +6691,6 @@
   <p:clrMapOvr>
     <a:masterClrMapping/>
   </p:clrMapOvr>
-</p:sld>
-</file>
-
-<file path=ppt/slides/slide9.xml><?xml version="1.0" encoding="utf-8"?>
-<p:sld xmlns:a="http://schemas.openxmlformats.org/drawingml/2006/main" xmlns:r="http://schemas.openxmlformats.org/officeDocument/2006/relationships" xmlns:p="http://schemas.openxmlformats.org/presentationml/2006/main">
-  <p:cSld>
-    <p:spTree>
-      <p:nvGrpSpPr>
-        <p:cNvPr id="1" name=""/>
-        <p:cNvGrpSpPr/>
-        <p:nvPr/>
-      </p:nvGrpSpPr>
-      <p:grpSpPr>
-        <a:xfrm>
-          <a:off x="0" y="0"/>
-          <a:ext cx="0" cy="0"/>
-          <a:chOff x="0" y="0"/>
-          <a:chExt cx="0" cy="0"/>
-        </a:xfrm>
-      </p:grpSpPr>
-      <p:sp>
-        <p:nvSpPr>
-          <p:cNvPr id="11" name="TextBox 10"/>
-          <p:cNvSpPr txBox="1"/>
-          <p:nvPr/>
-        </p:nvSpPr>
-        <p:spPr>
-          <a:xfrm>
-            <a:off x="485056" y="923950"/>
-            <a:ext cx="6256312" cy="1323439"/>
-          </a:xfrm>
-          <a:prstGeom prst="rect">
-            <a:avLst/>
-          </a:prstGeom>
-          <a:noFill/>
-        </p:spPr>
-        <p:txBody>
-          <a:bodyPr wrap="square" rtlCol="0">
-            <a:spAutoFit/>
-          </a:bodyPr>
-          <a:lstStyle/>
-          <a:p>
-            <a:r>
-              <a:rPr lang="en-ID" sz="1600" dirty="0" smtClean="0"/>
-              <a:t>Exercise 1</a:t>
-            </a:r>
-          </a:p>
-          <a:p>
-            <a:pPr marL="285750" indent="-285750">
-              <a:buFont typeface="Arial" panose="020B0604020202020204" pitchFamily="34" charset="0"/>
-              <a:buChar char="•"/>
-            </a:pPr>
-            <a:r>
-              <a:rPr lang="en-ID" sz="1600" dirty="0" smtClean="0"/>
-              <a:t>Clone </a:t>
-            </a:r>
-            <a:r>
-              <a:rPr lang="en-ID" sz="1600" dirty="0" smtClean="0"/>
-              <a:t>your </a:t>
-            </a:r>
-            <a:r>
-              <a:rPr lang="en-ID" sz="1600" dirty="0" smtClean="0"/>
-              <a:t>branch from Workshop </a:t>
-            </a:r>
-            <a:r>
-              <a:rPr lang="en-ID" sz="1600" dirty="0" smtClean="0"/>
-              <a:t>I </a:t>
-            </a:r>
-            <a:r>
-              <a:rPr lang="en-ID" sz="900" dirty="0" smtClean="0"/>
-              <a:t>(remember the command to clone a specific command)</a:t>
-            </a:r>
-            <a:endParaRPr lang="en-ID" sz="900" dirty="0" smtClean="0"/>
-          </a:p>
-          <a:p>
-            <a:pPr marL="285750" indent="-285750">
-              <a:buFont typeface="Arial" panose="020B0604020202020204" pitchFamily="34" charset="0"/>
-              <a:buChar char="•"/>
-            </a:pPr>
-            <a:r>
-              <a:rPr lang="en-ID" sz="1600" dirty="0" smtClean="0"/>
-              <a:t>Edit something and create multiple </a:t>
-            </a:r>
-            <a:r>
-              <a:rPr lang="en-ID" sz="1600" dirty="0" smtClean="0"/>
-              <a:t>commit points</a:t>
-            </a:r>
-            <a:endParaRPr lang="en-ID" sz="1600" dirty="0" smtClean="0"/>
-          </a:p>
-          <a:p>
-            <a:pPr marL="285750" indent="-285750">
-              <a:buFont typeface="Arial" panose="020B0604020202020204" pitchFamily="34" charset="0"/>
-              <a:buChar char="•"/>
-            </a:pPr>
-            <a:r>
-              <a:rPr lang="en-ID" sz="1600" i="1" dirty="0"/>
-              <a:t>S</a:t>
-            </a:r>
-            <a:r>
-              <a:rPr lang="en-ID" sz="1600" i="1" dirty="0" smtClean="0"/>
-              <a:t>quash some </a:t>
-            </a:r>
-            <a:r>
-              <a:rPr lang="en-ID" sz="1600" i="1" dirty="0" smtClean="0"/>
-              <a:t>commit points </a:t>
-            </a:r>
-            <a:r>
-              <a:rPr lang="en-ID" sz="1600" i="1" dirty="0" smtClean="0"/>
-              <a:t>together</a:t>
-            </a:r>
-          </a:p>
-          <a:p>
-            <a:pPr marL="285750" indent="-285750">
-              <a:buFont typeface="Arial" panose="020B0604020202020204" pitchFamily="34" charset="0"/>
-              <a:buChar char="•"/>
-            </a:pPr>
-            <a:r>
-              <a:rPr lang="en-ID" sz="1600" dirty="0" smtClean="0"/>
-              <a:t>Publish your branch again</a:t>
-            </a:r>
-          </a:p>
-        </p:txBody>
-      </p:sp>
-      <p:sp>
-        <p:nvSpPr>
-          <p:cNvPr id="6" name="TextBox 5"/>
-          <p:cNvSpPr txBox="1"/>
-          <p:nvPr/>
-        </p:nvSpPr>
-        <p:spPr>
-          <a:xfrm>
-            <a:off x="332656" y="195486"/>
-            <a:ext cx="6192688" cy="369332"/>
-          </a:xfrm>
-          <a:prstGeom prst="rect">
-            <a:avLst/>
-          </a:prstGeom>
-          <a:noFill/>
-        </p:spPr>
-        <p:txBody>
-          <a:bodyPr wrap="square" rtlCol="0">
-            <a:spAutoFit/>
-          </a:bodyPr>
-          <a:lstStyle/>
-          <a:p>
-            <a:r>
-              <a:rPr lang="en-ID" b="1" dirty="0" smtClean="0">
-                <a:solidFill>
-                  <a:srgbClr val="392900"/>
-                </a:solidFill>
-                <a:latin typeface="Bookman Old Style" panose="02050604050505020204" pitchFamily="18" charset="0"/>
-              </a:rPr>
-              <a:t>CDC – git interactive rebase / Practice</a:t>
-            </a:r>
-            <a:endParaRPr lang="en-US" b="1" dirty="0">
-              <a:solidFill>
-                <a:srgbClr val="392900"/>
-              </a:solidFill>
-              <a:latin typeface="Bookman Old Style" panose="02050604050505020204" pitchFamily="18" charset="0"/>
-            </a:endParaRPr>
-          </a:p>
-        </p:txBody>
-      </p:sp>
-      <p:sp>
-        <p:nvSpPr>
-          <p:cNvPr id="7" name="TextBox 6"/>
-          <p:cNvSpPr txBox="1"/>
-          <p:nvPr/>
-        </p:nvSpPr>
-        <p:spPr>
-          <a:xfrm>
-            <a:off x="485056" y="2634137"/>
-            <a:ext cx="5680248" cy="1323439"/>
-          </a:xfrm>
-          <a:prstGeom prst="rect">
-            <a:avLst/>
-          </a:prstGeom>
-          <a:noFill/>
-        </p:spPr>
-        <p:txBody>
-          <a:bodyPr wrap="square" rtlCol="0">
-            <a:spAutoFit/>
-          </a:bodyPr>
-          <a:lstStyle/>
-          <a:p>
-            <a:r>
-              <a:rPr lang="en-ID" sz="1600" dirty="0" smtClean="0"/>
-              <a:t>Exercise 2</a:t>
-            </a:r>
-          </a:p>
-          <a:p>
-            <a:pPr marL="285750" indent="-285750">
-              <a:buFont typeface="Arial" panose="020B0604020202020204" pitchFamily="34" charset="0"/>
-              <a:buChar char="•"/>
-            </a:pPr>
-            <a:r>
-              <a:rPr lang="en-ID" sz="1600" dirty="0" smtClean="0"/>
-              <a:t>Clone </a:t>
-            </a:r>
-            <a:r>
-              <a:rPr lang="en-ID" sz="1600" dirty="0" smtClean="0"/>
-              <a:t>your </a:t>
-            </a:r>
-            <a:r>
-              <a:rPr lang="en-ID" sz="1600" dirty="0" smtClean="0"/>
-              <a:t>branch from Workshop </a:t>
-            </a:r>
-            <a:r>
-              <a:rPr lang="en-ID" sz="1600" dirty="0" smtClean="0"/>
-              <a:t>I </a:t>
-            </a:r>
-            <a:endParaRPr lang="en-ID" sz="1600" dirty="0" smtClean="0"/>
-          </a:p>
-          <a:p>
-            <a:pPr marL="285750" indent="-285750">
-              <a:buFont typeface="Arial" panose="020B0604020202020204" pitchFamily="34" charset="0"/>
-              <a:buChar char="•"/>
-            </a:pPr>
-            <a:r>
-              <a:rPr lang="en-ID" sz="1600" dirty="0" smtClean="0"/>
-              <a:t>Edit something and create multiple commits</a:t>
-            </a:r>
-          </a:p>
-          <a:p>
-            <a:pPr marL="285750" indent="-285750">
-              <a:buFont typeface="Arial" panose="020B0604020202020204" pitchFamily="34" charset="0"/>
-              <a:buChar char="•"/>
-            </a:pPr>
-            <a:r>
-              <a:rPr lang="en-ID" sz="1600" i="1" dirty="0" smtClean="0"/>
-              <a:t>Change the commit messages, be more specific</a:t>
-            </a:r>
-          </a:p>
-          <a:p>
-            <a:pPr marL="285750" indent="-285750">
-              <a:buFont typeface="Arial" panose="020B0604020202020204" pitchFamily="34" charset="0"/>
-              <a:buChar char="•"/>
-            </a:pPr>
-            <a:r>
-              <a:rPr lang="en-ID" sz="1600" dirty="0" smtClean="0"/>
-              <a:t>Publish your branch again</a:t>
-            </a:r>
-          </a:p>
-        </p:txBody>
-      </p:sp>
-    </p:spTree>
-    <p:extLst>
-      <p:ext uri="{BB962C8B-B14F-4D97-AF65-F5344CB8AC3E}">
-        <p14:creationId xmlns:p14="http://schemas.microsoft.com/office/powerpoint/2010/main" val="3693267280"/>
-      </p:ext>
-    </p:extLst>
-  </p:cSld>
-  <p:clrMapOvr>
-    <a:masterClrMapping/>
-  </p:clrMapOvr>
-  <p:timing>
-    <p:tnLst>
-      <p:par>
-        <p:cTn id="1" dur="indefinite" restart="never" nodeType="tmRoot"/>
-      </p:par>
-    </p:tnLst>
-  </p:timing>
 </p:sld>
 </file>
 
@@ -7201,15 +7233,6 @@
 </file>
 
 <file path=customXml/item2.xml><?xml version="1.0" encoding="utf-8"?>
-<?mso-contentType ?>
-<FormTemplates xmlns="http://schemas.microsoft.com/sharepoint/v3/contenttype/forms">
-  <Display>DocumentLibraryForm</Display>
-  <Edit>DocumentLibraryForm</Edit>
-  <New>DocumentLibraryForm</New>
-</FormTemplates>
-</file>
-
-<file path=customXml/item3.xml><?xml version="1.0" encoding="utf-8"?>
 <ct:contentTypeSchema xmlns:ct="http://schemas.microsoft.com/office/2006/metadata/contentType" xmlns:ma="http://schemas.microsoft.com/office/2006/metadata/properties/metaAttributes" ct:_="" ma:_="" ma:contentTypeName="Document" ma:contentTypeID="0x0101003684E481DE84C9499EF0F81972D7EF96" ma:contentTypeVersion="0" ma:contentTypeDescription="Create a new document." ma:contentTypeScope="" ma:versionID="1082b6f87e9a9efb3f4dd16ca55e9303">
   <xsd:schema xmlns:xsd="http://www.w3.org/2001/XMLSchema" xmlns:xs="http://www.w3.org/2001/XMLSchema" xmlns:p="http://schemas.microsoft.com/office/2006/metadata/properties" targetNamespace="http://schemas.microsoft.com/office/2006/metadata/properties" ma:root="true" ma:fieldsID="1b05d82d297216baf5b26c55225140df">
     <xsd:element name="properties">
@@ -7323,6 +7346,15 @@
 </ct:contentTypeSchema>
 </file>
 
+<file path=customXml/item3.xml><?xml version="1.0" encoding="utf-8"?>
+<?mso-contentType ?>
+<FormTemplates xmlns="http://schemas.microsoft.com/sharepoint/v3/contenttype/forms">
+  <Display>DocumentLibraryForm</Display>
+  <Edit>DocumentLibraryForm</Edit>
+  <New>DocumentLibraryForm</New>
+</FormTemplates>
+</file>
+
 <file path=customXml/itemProps1.xml><?xml version="1.0" encoding="utf-8"?>
 <ds:datastoreItem xmlns:ds="http://schemas.openxmlformats.org/officeDocument/2006/customXml" ds:itemID="{12B43294-76B4-4246-849F-628E6870A5FD}">
   <ds:schemaRefs>
@@ -7339,14 +7371,6 @@
 </file>
 
 <file path=customXml/itemProps2.xml><?xml version="1.0" encoding="utf-8"?>
-<ds:datastoreItem xmlns:ds="http://schemas.openxmlformats.org/officeDocument/2006/customXml" ds:itemID="{DB5E681D-860B-4D22-80CF-C7472F8C312F}">
-  <ds:schemaRefs>
-    <ds:schemaRef ds:uri="http://schemas.microsoft.com/sharepoint/v3/contenttype/forms"/>
-  </ds:schemaRefs>
-</ds:datastoreItem>
-</file>
-
-<file path=customXml/itemProps3.xml><?xml version="1.0" encoding="utf-8"?>
 <ds:datastoreItem xmlns:ds="http://schemas.openxmlformats.org/officeDocument/2006/customXml" ds:itemID="{6B82694F-752F-4827-A348-4AA5A968F420}">
   <ds:schemaRefs>
     <ds:schemaRef ds:uri="http://schemas.microsoft.com/office/2006/metadata/contentType"/>
@@ -7360,4 +7384,12 @@
     <ds:schemaRef ds:uri="http://schemas.microsoft.com/office/infopath/2007/PartnerControls"/>
   </ds:schemaRefs>
 </ds:datastoreItem>
+</file>
+
+<file path=customXml/itemProps3.xml><?xml version="1.0" encoding="utf-8"?>
+<ds:datastoreItem xmlns:ds="http://schemas.openxmlformats.org/officeDocument/2006/customXml" ds:itemID="{DB5E681D-860B-4D22-80CF-C7472F8C312F}">
+  <ds:schemaRefs>
+    <ds:schemaRef ds:uri="http://schemas.microsoft.com/sharepoint/v3/contenttype/forms"/>
+  </ds:schemaRefs>
+</ds:datastoreItem>
 </file>
</xml_diff>